<commit_message>
Simplified intro to meta with a MINI standard excercise
</commit_message>
<xml_diff>
--- a/instructors/04-intro-to-metadata.pptx
+++ b/instructors/04-intro-to-metadata.pptx
@@ -5,21 +5,24 @@
     <p:sldMasterId id="2147483648" r:id="rId1"/>
   </p:sldMasterIdLst>
   <p:notesMasterIdLst>
-    <p:notesMasterId r:id="rId14"/>
+    <p:notesMasterId r:id="rId17"/>
   </p:notesMasterIdLst>
   <p:sldIdLst>
     <p:sldId id="256" r:id="rId2"/>
-    <p:sldId id="257" r:id="rId3"/>
-    <p:sldId id="269" r:id="rId4"/>
-    <p:sldId id="259" r:id="rId5"/>
-    <p:sldId id="270" r:id="rId6"/>
-    <p:sldId id="258" r:id="rId7"/>
-    <p:sldId id="271" r:id="rId8"/>
-    <p:sldId id="273" r:id="rId9"/>
-    <p:sldId id="272" r:id="rId10"/>
-    <p:sldId id="275" r:id="rId11"/>
-    <p:sldId id="264" r:id="rId12"/>
-    <p:sldId id="268" r:id="rId13"/>
+    <p:sldId id="281" r:id="rId3"/>
+    <p:sldId id="257" r:id="rId4"/>
+    <p:sldId id="280" r:id="rId5"/>
+    <p:sldId id="269" r:id="rId6"/>
+    <p:sldId id="259" r:id="rId7"/>
+    <p:sldId id="270" r:id="rId8"/>
+    <p:sldId id="277" r:id="rId9"/>
+    <p:sldId id="278" r:id="rId10"/>
+    <p:sldId id="276" r:id="rId11"/>
+    <p:sldId id="272" r:id="rId12"/>
+    <p:sldId id="279" r:id="rId13"/>
+    <p:sldId id="275" r:id="rId14"/>
+    <p:sldId id="264" r:id="rId15"/>
+    <p:sldId id="268" r:id="rId16"/>
   </p:sldIdLst>
   <p:sldSz cx="12192000" cy="6858000"/>
   <p:notesSz cx="6858000" cy="9144000"/>
@@ -208,7 +211,7 @@
           <a:p>
             <a:fld id="{FA57F229-43F7-7D47-A634-B37BDFAB7535}" type="datetimeFigureOut">
               <a:rPr lang="en-GB" smtClean="0"/>
-              <a:t>17/06/2021</a:t>
+              <a:t>06/10/2021</a:t>
             </a:fld>
             <a:endParaRPr lang="en-GB"/>
           </a:p>
@@ -859,7 +862,7 @@
           <a:p>
             <a:fld id="{CCB04583-82FC-EB4C-9DD9-0626DE3C6BC2}" type="slidenum">
               <a:rPr lang="en-GB" smtClean="0"/>
-              <a:t>2</a:t>
+              <a:t>3</a:t>
             </a:fld>
             <a:endParaRPr lang="en-GB"/>
           </a:p>
@@ -923,7 +926,7 @@
           <a:lstStyle/>
           <a:p>
             <a:r>
-              <a:rPr lang="en-GB" sz="1200" b="0" i="0" kern="1200" dirty="0">
+              <a:rPr lang="en-GB" sz="1200" b="1" i="0" kern="1200" dirty="0">
                 <a:solidFill>
                   <a:schemeClr val="tx1"/>
                 </a:solidFill>
@@ -932,8 +935,315 @@
                 <a:ea typeface="+mn-ea"/>
                 <a:cs typeface="+mn-cs"/>
               </a:rPr>
-              <a:t>In groups, identify different types of metadata (administrative, descriptive, structural) present in this example.</a:t>
-            </a:r>
+              <a:t>Image metadata</a:t>
+            </a:r>
+          </a:p>
+          <a:p>
+            <a:r>
+              <a:rPr lang="en-GB" sz="1200" b="0" i="0" kern="1200" dirty="0">
+                <a:solidFill>
+                  <a:schemeClr val="tx1"/>
+                </a:solidFill>
+                <a:effectLst/>
+                <a:latin typeface="+mn-lt"/>
+                <a:ea typeface="+mn-ea"/>
+                <a:cs typeface="+mn-cs"/>
+              </a:rPr>
+              <a:t>Name: OP50 D10Ad_06.czi Image ID: 3485 Owner: Maria Eugenia Goya ORCID: 0000-0002-5031-2470</a:t>
+            </a:r>
+          </a:p>
+          <a:p>
+            <a:r>
+              <a:rPr lang="en-GB" sz="1200" b="0" i="0" kern="1200" dirty="0">
+                <a:solidFill>
+                  <a:schemeClr val="tx1"/>
+                </a:solidFill>
+                <a:effectLst/>
+                <a:latin typeface="+mn-lt"/>
+                <a:ea typeface="+mn-ea"/>
+                <a:cs typeface="+mn-cs"/>
+              </a:rPr>
+              <a:t>Acquisition Date: 2018-12-12 17:53:55 Import Date: 2020-04-30 22:38:59 Dimensions (XY): 1344 x 1024 Pixels Type: uint16 Pixels Size (XYZ) (µm): 0.16 x 0.16 x 1.00 Z-sections/Timepoints: 56 x 1 Channels: TL DIC, </a:t>
+            </a:r>
+            <a:r>
+              <a:rPr lang="en-GB" sz="1200" b="0" i="0" kern="1200" dirty="0" err="1">
+                <a:solidFill>
+                  <a:schemeClr val="tx1"/>
+                </a:solidFill>
+                <a:effectLst/>
+                <a:latin typeface="+mn-lt"/>
+                <a:ea typeface="+mn-ea"/>
+                <a:cs typeface="+mn-cs"/>
+              </a:rPr>
+              <a:t>TagYFP</a:t>
+            </a:r>
+            <a:r>
+              <a:rPr lang="en-GB" sz="1200" b="0" i="0" kern="1200" dirty="0">
+                <a:solidFill>
+                  <a:schemeClr val="tx1"/>
+                </a:solidFill>
+                <a:effectLst/>
+                <a:latin typeface="+mn-lt"/>
+                <a:ea typeface="+mn-ea"/>
+                <a:cs typeface="+mn-cs"/>
+              </a:rPr>
+              <a:t> ROI Count: 0</a:t>
+            </a:r>
+          </a:p>
+          <a:p>
+            <a:r>
+              <a:rPr lang="en-GB" sz="1200" b="0" i="0" kern="1200" dirty="0">
+                <a:solidFill>
+                  <a:schemeClr val="tx1"/>
+                </a:solidFill>
+                <a:effectLst/>
+                <a:latin typeface="+mn-lt"/>
+                <a:ea typeface="+mn-ea"/>
+                <a:cs typeface="+mn-cs"/>
+              </a:rPr>
+              <a:t>Tags: time course; day 10; adults; food switching; E. coli OP50; NL5901; C. elegans</a:t>
+            </a:r>
+          </a:p>
+          <a:p>
+            <a:r>
+              <a:rPr lang="en-GB" sz="1200" b="1" i="0" kern="1200" dirty="0">
+                <a:solidFill>
+                  <a:schemeClr val="tx1"/>
+                </a:solidFill>
+                <a:effectLst/>
+                <a:latin typeface="+mn-lt"/>
+                <a:ea typeface="+mn-ea"/>
+                <a:cs typeface="+mn-cs"/>
+              </a:rPr>
+              <a:t>Dataset metadata</a:t>
+            </a:r>
+          </a:p>
+          <a:p>
+            <a:r>
+              <a:rPr lang="en-GB" sz="1200" b="0" i="0" kern="1200" dirty="0">
+                <a:solidFill>
+                  <a:schemeClr val="tx1"/>
+                </a:solidFill>
+                <a:effectLst/>
+                <a:latin typeface="+mn-lt"/>
+                <a:ea typeface="+mn-ea"/>
+                <a:cs typeface="+mn-cs"/>
+              </a:rPr>
+              <a:t>Name: Figure2_Figure2B Dataset ID: 263 Owner: Maria Eugenia Goya ORCID: 0000-0002-5031-2470</a:t>
+            </a:r>
+          </a:p>
+          <a:p>
+            <a:r>
+              <a:rPr lang="en-GB" sz="1200" b="0" i="0" kern="1200" dirty="0">
+                <a:solidFill>
+                  <a:schemeClr val="tx1"/>
+                </a:solidFill>
+                <a:effectLst/>
+                <a:latin typeface="+mn-lt"/>
+                <a:ea typeface="+mn-ea"/>
+                <a:cs typeface="+mn-cs"/>
+              </a:rPr>
+              <a:t>Description: The datasets contains a time course of </a:t>
+            </a:r>
+            <a:r>
+              <a:rPr lang="el-GR" sz="1200" b="0" i="0" kern="1200" dirty="0">
+                <a:solidFill>
+                  <a:schemeClr val="tx1"/>
+                </a:solidFill>
+                <a:effectLst/>
+                <a:latin typeface="+mn-lt"/>
+                <a:ea typeface="+mn-ea"/>
+                <a:cs typeface="+mn-cs"/>
+              </a:rPr>
+              <a:t>α-</a:t>
+            </a:r>
+            <a:r>
+              <a:rPr lang="en-GB" sz="1200" b="0" i="0" kern="1200" dirty="0" err="1">
+                <a:solidFill>
+                  <a:schemeClr val="tx1"/>
+                </a:solidFill>
+                <a:effectLst/>
+                <a:latin typeface="+mn-lt"/>
+                <a:ea typeface="+mn-ea"/>
+                <a:cs typeface="+mn-cs"/>
+              </a:rPr>
+              <a:t>syn</a:t>
+            </a:r>
+            <a:r>
+              <a:rPr lang="en-GB" sz="1200" b="0" i="0" kern="1200" dirty="0">
+                <a:solidFill>
+                  <a:schemeClr val="tx1"/>
+                </a:solidFill>
+                <a:effectLst/>
+                <a:latin typeface="+mn-lt"/>
+                <a:ea typeface="+mn-ea"/>
+                <a:cs typeface="+mn-cs"/>
+              </a:rPr>
+              <a:t> aggregation in NL5901 C. elegans worms after a food switch at the L4 stage:</a:t>
+            </a:r>
+          </a:p>
+          <a:p>
+            <a:r>
+              <a:rPr lang="en-GB" sz="1200" b="0" i="0" kern="1200" dirty="0">
+                <a:solidFill>
+                  <a:schemeClr val="tx1"/>
+                </a:solidFill>
+                <a:effectLst/>
+                <a:latin typeface="+mn-lt"/>
+                <a:ea typeface="+mn-ea"/>
+                <a:cs typeface="+mn-cs"/>
+              </a:rPr>
+              <a:t>E. coli OP50 to OP50 Day 01 adults Day 03 adults Day 05 adults Day 07 adults Day 10 adults Day 13 adults</a:t>
+            </a:r>
+          </a:p>
+          <a:p>
+            <a:r>
+              <a:rPr lang="en-GB" sz="1200" b="0" i="0" kern="1200" dirty="0">
+                <a:solidFill>
+                  <a:schemeClr val="tx1"/>
+                </a:solidFill>
+                <a:effectLst/>
+                <a:latin typeface="+mn-lt"/>
+                <a:ea typeface="+mn-ea"/>
+                <a:cs typeface="+mn-cs"/>
+              </a:rPr>
+              <a:t>E. coli OP50 to B. subtilis PXN21 Day 01 adults Day 03 adults Day 05 adults Day 07 adults Day 10 adults Day 13 adults</a:t>
+            </a:r>
+          </a:p>
+          <a:p>
+            <a:r>
+              <a:rPr lang="en-GB" sz="1200" b="0" i="0" kern="1200" dirty="0">
+                <a:solidFill>
+                  <a:schemeClr val="tx1"/>
+                </a:solidFill>
+                <a:effectLst/>
+                <a:latin typeface="+mn-lt"/>
+                <a:ea typeface="+mn-ea"/>
+                <a:cs typeface="+mn-cs"/>
+              </a:rPr>
+              <a:t>Images were taken at 6 developmental timepoints (D1Ad, D3Ad, D5Ad, D7Ad, D10Ad, D13Ad)</a:t>
+            </a:r>
+          </a:p>
+          <a:p>
+            <a:r>
+              <a:rPr lang="en-GB" sz="1200" b="0" i="0" kern="1200" dirty="0">
+                <a:solidFill>
+                  <a:schemeClr val="tx1"/>
+                </a:solidFill>
+                <a:effectLst/>
+                <a:latin typeface="+mn-lt"/>
+                <a:ea typeface="+mn-ea"/>
+                <a:cs typeface="+mn-cs"/>
+              </a:rPr>
+              <a:t>* Some images contain more than one nematode.</a:t>
+            </a:r>
+          </a:p>
+          <a:p>
+            <a:r>
+              <a:rPr lang="en-GB" sz="1200" b="0" i="0" kern="1200" dirty="0">
+                <a:solidFill>
+                  <a:schemeClr val="tx1"/>
+                </a:solidFill>
+                <a:effectLst/>
+                <a:latin typeface="+mn-lt"/>
+                <a:ea typeface="+mn-ea"/>
+                <a:cs typeface="+mn-cs"/>
+              </a:rPr>
+              <a:t>Each image contains ~30 (or more) Z-sections, 1 µmeters apart. The </a:t>
+            </a:r>
+            <a:r>
+              <a:rPr lang="en-GB" sz="1200" b="0" i="0" kern="1200" dirty="0" err="1">
+                <a:solidFill>
+                  <a:schemeClr val="tx1"/>
+                </a:solidFill>
+                <a:effectLst/>
+                <a:latin typeface="+mn-lt"/>
+                <a:ea typeface="+mn-ea"/>
+                <a:cs typeface="+mn-cs"/>
+              </a:rPr>
+              <a:t>TagYFP</a:t>
+            </a:r>
+            <a:r>
+              <a:rPr lang="en-GB" sz="1200" b="0" i="0" kern="1200" dirty="0">
+                <a:solidFill>
+                  <a:schemeClr val="tx1"/>
+                </a:solidFill>
+                <a:effectLst/>
+                <a:latin typeface="+mn-lt"/>
+                <a:ea typeface="+mn-ea"/>
+                <a:cs typeface="+mn-cs"/>
+              </a:rPr>
+              <a:t> channel is used to follow the alpha-synuclein particles. The TL DIC channel is used to image the whole nematode head.</a:t>
+            </a:r>
+          </a:p>
+          <a:p>
+            <a:r>
+              <a:rPr lang="en-GB" sz="1200" b="0" i="0" kern="1200" dirty="0">
+                <a:solidFill>
+                  <a:schemeClr val="tx1"/>
+                </a:solidFill>
+                <a:effectLst/>
+                <a:latin typeface="+mn-lt"/>
+                <a:ea typeface="+mn-ea"/>
+                <a:cs typeface="+mn-cs"/>
+              </a:rPr>
+              <a:t>These images were used to construct Figure 2B of the Cell Reports paper (</a:t>
+            </a:r>
+            <a:r>
+              <a:rPr lang="en-GB" sz="1200" b="0" i="0" u="none" strike="noStrike" kern="1200" dirty="0">
+                <a:solidFill>
+                  <a:schemeClr val="tx1"/>
+                </a:solidFill>
+                <a:effectLst/>
+                <a:latin typeface="+mn-lt"/>
+                <a:ea typeface="+mn-ea"/>
+                <a:cs typeface="+mn-cs"/>
+                <a:hlinkClick r:id="rId3"/>
+              </a:rPr>
+              <a:t>https://doi.org/10.1016/j.celrep.2019.12.078</a:t>
+            </a:r>
+            <a:r>
+              <a:rPr lang="en-GB" sz="1200" b="0" i="0" kern="1200" dirty="0">
+                <a:solidFill>
+                  <a:schemeClr val="tx1"/>
+                </a:solidFill>
+                <a:effectLst/>
+                <a:latin typeface="+mn-lt"/>
+                <a:ea typeface="+mn-ea"/>
+                <a:cs typeface="+mn-cs"/>
+              </a:rPr>
+              <a:t>).</a:t>
+            </a:r>
+          </a:p>
+          <a:p>
+            <a:r>
+              <a:rPr lang="en-GB" sz="1200" b="0" i="0" kern="1200" dirty="0">
+                <a:solidFill>
+                  <a:schemeClr val="tx1"/>
+                </a:solidFill>
+                <a:effectLst/>
+                <a:latin typeface="+mn-lt"/>
+                <a:ea typeface="+mn-ea"/>
+                <a:cs typeface="+mn-cs"/>
+              </a:rPr>
+              <a:t>Creation date: 2020-04-30 22:16:39</a:t>
+            </a:r>
+          </a:p>
+          <a:p>
+            <a:r>
+              <a:rPr lang="en-GB" sz="1200" b="0" i="0" kern="1200" dirty="0">
+                <a:solidFill>
+                  <a:schemeClr val="tx1"/>
+                </a:solidFill>
+                <a:effectLst/>
+                <a:latin typeface="+mn-lt"/>
+                <a:ea typeface="+mn-ea"/>
+                <a:cs typeface="+mn-cs"/>
+              </a:rPr>
+              <a:t>Tags: protein aggregation; time course; E. coli OP50 to B. subtilis PXN21; food switching; E. coli OP50; 10.1016/j.celrep.2019.12.078; NL5901; C. elegans</a:t>
+            </a:r>
+          </a:p>
+          <a:p>
             <a:endParaRPr lang="en-GB" dirty="0"/>
           </a:p>
         </p:txBody>
@@ -964,7 +1274,7 @@
     </p:spTree>
     <p:extLst>
       <p:ext uri="{BB962C8B-B14F-4D97-AF65-F5344CB8AC3E}">
-        <p14:creationId xmlns:p14="http://schemas.microsoft.com/office/powerpoint/2010/main" val="2758379892"/>
+        <p14:creationId xmlns:p14="http://schemas.microsoft.com/office/powerpoint/2010/main" val="2888819149"/>
       </p:ext>
     </p:extLst>
   </p:cSld>
@@ -1018,6 +1328,18 @@
           <a:bodyPr/>
           <a:lstStyle/>
           <a:p>
+            <a:r>
+              <a:rPr lang="en-GB" sz="1200" b="0" i="0" kern="1200" dirty="0">
+                <a:solidFill>
+                  <a:schemeClr val="tx1"/>
+                </a:solidFill>
+                <a:effectLst/>
+                <a:latin typeface="+mn-lt"/>
+                <a:ea typeface="+mn-ea"/>
+                <a:cs typeface="+mn-cs"/>
+              </a:rPr>
+              <a:t>In groups, identify different types of metadata (administrative, descriptive, structural) present in this example.</a:t>
+            </a:r>
             <a:endParaRPr lang="en-GB" dirty="0"/>
           </a:p>
         </p:txBody>
@@ -1039,7 +1361,7 @@
           <a:p>
             <a:fld id="{CCB04583-82FC-EB4C-9DD9-0626DE3C6BC2}" type="slidenum">
               <a:rPr lang="en-GB" smtClean="0"/>
-              <a:t>5</a:t>
+              <a:t>6</a:t>
             </a:fld>
             <a:endParaRPr lang="en-GB"/>
           </a:p>
@@ -1048,7 +1370,7 @@
     </p:spTree>
     <p:extLst>
       <p:ext uri="{BB962C8B-B14F-4D97-AF65-F5344CB8AC3E}">
-        <p14:creationId xmlns:p14="http://schemas.microsoft.com/office/powerpoint/2010/main" val="750833953"/>
+        <p14:creationId xmlns:p14="http://schemas.microsoft.com/office/powerpoint/2010/main" val="2758379892"/>
       </p:ext>
     </p:extLst>
   </p:cSld>
@@ -1102,282 +1424,6 @@
           <a:bodyPr/>
           <a:lstStyle/>
           <a:p>
-            <a:r>
-              <a:rPr lang="en-GB" sz="1200" b="0" i="0" kern="1200" dirty="0">
-                <a:solidFill>
-                  <a:schemeClr val="tx1"/>
-                </a:solidFill>
-                <a:effectLst/>
-                <a:latin typeface="+mn-lt"/>
-                <a:ea typeface="+mn-ea"/>
-                <a:cs typeface="+mn-cs"/>
-              </a:rPr>
-              <a:t>Have you ever done a search in </a:t>
-            </a:r>
-            <a:r>
-              <a:rPr lang="en-GB" sz="1200" b="0" i="0" kern="1200" dirty="0" err="1">
-                <a:solidFill>
-                  <a:schemeClr val="tx1"/>
-                </a:solidFill>
-                <a:effectLst/>
-                <a:latin typeface="+mn-lt"/>
-                <a:ea typeface="+mn-ea"/>
-                <a:cs typeface="+mn-cs"/>
-              </a:rPr>
-              <a:t>pubmed</a:t>
-            </a:r>
-            <a:r>
-              <a:rPr lang="en-GB" sz="1200" b="0" i="0" kern="1200" dirty="0">
-                <a:solidFill>
-                  <a:schemeClr val="tx1"/>
-                </a:solidFill>
-                <a:effectLst/>
-                <a:latin typeface="+mn-lt"/>
-                <a:ea typeface="+mn-ea"/>
-                <a:cs typeface="+mn-cs"/>
-              </a:rPr>
-              <a:t> and found that you have </a:t>
-            </a:r>
-            <a:r>
-              <a:rPr lang="en-GB" sz="1200" b="0" i="1" kern="1200" dirty="0">
-                <a:solidFill>
-                  <a:schemeClr val="tx1"/>
-                </a:solidFill>
-                <a:effectLst/>
-                <a:latin typeface="+mn-lt"/>
-                <a:ea typeface="+mn-ea"/>
-                <a:cs typeface="+mn-cs"/>
-              </a:rPr>
-              <a:t>doppelganger</a:t>
-            </a:r>
-            <a:r>
-              <a:rPr lang="en-GB" sz="1200" b="0" i="0" kern="1200" dirty="0">
-                <a:solidFill>
-                  <a:schemeClr val="tx1"/>
-                </a:solidFill>
-                <a:effectLst/>
-                <a:latin typeface="+mn-lt"/>
-                <a:ea typeface="+mn-ea"/>
-                <a:cs typeface="+mn-cs"/>
-              </a:rPr>
-              <a:t>? So how can you uniquely associate something you created to just you and no other researcher that has the same name?</a:t>
-            </a:r>
-          </a:p>
-          <a:p>
-            <a:r>
-              <a:rPr lang="en-GB" sz="1200" b="0" i="0" u="none" strike="noStrike" kern="1200" dirty="0">
-                <a:solidFill>
-                  <a:schemeClr val="tx1"/>
-                </a:solidFill>
-                <a:effectLst/>
-                <a:latin typeface="+mn-lt"/>
-                <a:ea typeface="+mn-ea"/>
-                <a:cs typeface="+mn-cs"/>
-                <a:hlinkClick r:id="rId3"/>
-              </a:rPr>
-              <a:t>ORCID</a:t>
-            </a:r>
-            <a:r>
-              <a:rPr lang="en-GB" sz="1200" b="0" i="0" kern="1200" dirty="0">
-                <a:solidFill>
-                  <a:schemeClr val="tx1"/>
-                </a:solidFill>
-                <a:effectLst/>
-                <a:latin typeface="+mn-lt"/>
-                <a:ea typeface="+mn-ea"/>
-                <a:cs typeface="+mn-cs"/>
-              </a:rPr>
-              <a:t> </a:t>
-            </a:r>
-            <a:r>
-              <a:rPr lang="en-GB" sz="1200" b="0" i="0" kern="1200" dirty="0" err="1">
-                <a:solidFill>
-                  <a:schemeClr val="tx1"/>
-                </a:solidFill>
-                <a:effectLst/>
-                <a:latin typeface="+mn-lt"/>
-                <a:ea typeface="+mn-ea"/>
-                <a:cs typeface="+mn-cs"/>
-              </a:rPr>
-              <a:t>iD</a:t>
-            </a:r>
-            <a:r>
-              <a:rPr lang="en-GB" sz="1200" b="0" i="0" kern="1200" dirty="0">
-                <a:solidFill>
-                  <a:schemeClr val="tx1"/>
-                </a:solidFill>
-                <a:effectLst/>
-                <a:latin typeface="+mn-lt"/>
-                <a:ea typeface="+mn-ea"/>
-                <a:cs typeface="+mn-cs"/>
-              </a:rPr>
-              <a:t> is a free, unique, persistent identifier that you own and control—forever. It distinguishes you from every other researcher across disciplines, borders, and time.</a:t>
-            </a:r>
-          </a:p>
-          <a:p>
-            <a:r>
-              <a:rPr lang="en-GB" sz="1200" b="0" i="0" kern="1200" dirty="0">
-                <a:solidFill>
-                  <a:schemeClr val="tx1"/>
-                </a:solidFill>
-                <a:effectLst/>
-                <a:latin typeface="+mn-lt"/>
-                <a:ea typeface="+mn-ea"/>
-                <a:cs typeface="+mn-cs"/>
-              </a:rPr>
-              <a:t>ORCIDs of authors of this episode are:</a:t>
-            </a:r>
-          </a:p>
-          <a:p>
-            <a:r>
-              <a:rPr lang="en-GB" sz="1200" b="0" i="0" u="none" strike="noStrike" kern="1200" dirty="0">
-                <a:solidFill>
-                  <a:schemeClr val="tx1"/>
-                </a:solidFill>
-                <a:effectLst/>
-                <a:latin typeface="+mn-lt"/>
-                <a:ea typeface="+mn-ea"/>
-                <a:cs typeface="+mn-cs"/>
-                <a:hlinkClick r:id="rId4"/>
-              </a:rPr>
-              <a:t>0000-0002-0194-5706</a:t>
-            </a:r>
-            <a:endParaRPr lang="en-GB" sz="1200" b="0" i="0" kern="1200" dirty="0">
-              <a:solidFill>
-                <a:schemeClr val="tx1"/>
-              </a:solidFill>
-              <a:effectLst/>
-              <a:latin typeface="+mn-lt"/>
-              <a:ea typeface="+mn-ea"/>
-              <a:cs typeface="+mn-cs"/>
-            </a:endParaRPr>
-          </a:p>
-          <a:p>
-            <a:r>
-              <a:rPr lang="en-GB" sz="1200" b="0" i="0" u="none" strike="noStrike" kern="1200" dirty="0">
-                <a:solidFill>
-                  <a:schemeClr val="tx1"/>
-                </a:solidFill>
-                <a:effectLst/>
-                <a:latin typeface="+mn-lt"/>
-                <a:ea typeface="+mn-ea"/>
-                <a:cs typeface="+mn-cs"/>
-                <a:hlinkClick r:id="rId5"/>
-              </a:rPr>
-              <a:t>0000-0003-0737-2408</a:t>
-            </a:r>
-            <a:endParaRPr lang="en-GB" sz="1200" b="0" i="0" kern="1200" dirty="0">
-              <a:solidFill>
-                <a:schemeClr val="tx1"/>
-              </a:solidFill>
-              <a:effectLst/>
-              <a:latin typeface="+mn-lt"/>
-              <a:ea typeface="+mn-ea"/>
-              <a:cs typeface="+mn-cs"/>
-            </a:endParaRPr>
-          </a:p>
-          <a:p>
-            <a:r>
-              <a:rPr lang="en-GB" sz="1200" b="0" i="0" kern="1200" dirty="0">
-                <a:solidFill>
-                  <a:schemeClr val="tx1"/>
-                </a:solidFill>
-                <a:effectLst/>
-                <a:latin typeface="+mn-lt"/>
-                <a:ea typeface="+mn-ea"/>
-                <a:cs typeface="+mn-cs"/>
-              </a:rPr>
-              <a:t>You can connect your </a:t>
-            </a:r>
-            <a:r>
-              <a:rPr lang="en-GB" sz="1200" b="0" i="0" kern="1200" dirty="0" err="1">
-                <a:solidFill>
-                  <a:schemeClr val="tx1"/>
-                </a:solidFill>
-                <a:effectLst/>
-                <a:latin typeface="+mn-lt"/>
-                <a:ea typeface="+mn-ea"/>
-                <a:cs typeface="+mn-cs"/>
-              </a:rPr>
-              <a:t>iD</a:t>
-            </a:r>
-            <a:r>
-              <a:rPr lang="en-GB" sz="1200" b="0" i="0" kern="1200" dirty="0">
-                <a:solidFill>
-                  <a:schemeClr val="tx1"/>
-                </a:solidFill>
-                <a:effectLst/>
-                <a:latin typeface="+mn-lt"/>
-                <a:ea typeface="+mn-ea"/>
-                <a:cs typeface="+mn-cs"/>
-              </a:rPr>
-              <a:t> with your professional information—affiliations, grants, publications, peer review, and more. You can use your </a:t>
-            </a:r>
-            <a:r>
-              <a:rPr lang="en-GB" sz="1200" b="0" i="0" kern="1200" dirty="0" err="1">
-                <a:solidFill>
-                  <a:schemeClr val="tx1"/>
-                </a:solidFill>
-                <a:effectLst/>
-                <a:latin typeface="+mn-lt"/>
-                <a:ea typeface="+mn-ea"/>
-                <a:cs typeface="+mn-cs"/>
-              </a:rPr>
-              <a:t>iD</a:t>
-            </a:r>
-            <a:r>
-              <a:rPr lang="en-GB" sz="1200" b="0" i="0" kern="1200" dirty="0">
-                <a:solidFill>
-                  <a:schemeClr val="tx1"/>
-                </a:solidFill>
-                <a:effectLst/>
-                <a:latin typeface="+mn-lt"/>
-                <a:ea typeface="+mn-ea"/>
-                <a:cs typeface="+mn-cs"/>
-              </a:rPr>
-              <a:t> to share your information with other systems, ensuring you get recognition for all your contributions, saving you time and hassle, and reducing the risk of errors.</a:t>
-            </a:r>
-          </a:p>
-          <a:p>
-            <a:r>
-              <a:rPr lang="en-GB" sz="1200" b="0" i="0" kern="1200" dirty="0">
-                <a:solidFill>
-                  <a:schemeClr val="tx1"/>
-                </a:solidFill>
-                <a:effectLst/>
-                <a:latin typeface="+mn-lt"/>
-                <a:ea typeface="+mn-ea"/>
-                <a:cs typeface="+mn-cs"/>
-              </a:rPr>
-              <a:t>If you do not have an </a:t>
-            </a:r>
-            <a:r>
-              <a:rPr lang="en-GB" sz="1200" b="0" i="0" u="none" strike="noStrike" kern="1200" dirty="0">
-                <a:solidFill>
-                  <a:schemeClr val="tx1"/>
-                </a:solidFill>
-                <a:effectLst/>
-                <a:latin typeface="+mn-lt"/>
-                <a:ea typeface="+mn-ea"/>
-                <a:cs typeface="+mn-cs"/>
-                <a:hlinkClick r:id="rId3"/>
-              </a:rPr>
-              <a:t>ORCID</a:t>
-            </a:r>
-            <a:r>
-              <a:rPr lang="en-GB" sz="1200" b="0" i="0" kern="1200" dirty="0">
-                <a:solidFill>
-                  <a:schemeClr val="tx1"/>
-                </a:solidFill>
-                <a:effectLst/>
-                <a:latin typeface="+mn-lt"/>
-                <a:ea typeface="+mn-ea"/>
-                <a:cs typeface="+mn-cs"/>
-              </a:rPr>
-              <a:t>, you should register to get one!</a:t>
-            </a:r>
-          </a:p>
-          <a:p>
             <a:endParaRPr lang="en-GB" dirty="0"/>
           </a:p>
         </p:txBody>
@@ -1408,7 +1454,7 @@
     </p:spTree>
     <p:extLst>
       <p:ext uri="{BB962C8B-B14F-4D97-AF65-F5344CB8AC3E}">
-        <p14:creationId xmlns:p14="http://schemas.microsoft.com/office/powerpoint/2010/main" val="1480939894"/>
+        <p14:creationId xmlns:p14="http://schemas.microsoft.com/office/powerpoint/2010/main" val="750833953"/>
       </p:ext>
     </p:extLst>
   </p:cSld>
@@ -1462,23 +1508,6 @@
           <a:bodyPr/>
           <a:lstStyle/>
           <a:p>
-            <a:pPr marL="0" marR="0" lvl="0" indent="0" algn="l" defTabSz="914400" rtl="0" eaLnBrk="1" fontAlgn="auto" latinLnBrk="0" hangingPunct="1">
-              <a:lnSpc>
-                <a:spcPct val="100000"/>
-              </a:lnSpc>
-              <a:spcBef>
-                <a:spcPts val="0"/>
-              </a:spcBef>
-              <a:spcAft>
-                <a:spcPts val="0"/>
-              </a:spcAft>
-              <a:buClrTx/>
-              <a:buSzTx/>
-              <a:buFontTx/>
-              <a:buNone/>
-              <a:tabLst/>
-              <a:defRPr/>
-            </a:pPr>
             <a:r>
               <a:rPr lang="en-GB" sz="1200" b="0" i="0" kern="1200" dirty="0">
                 <a:solidFill>
@@ -1489,7 +1518,7 @@
                 <a:ea typeface="+mn-ea"/>
                 <a:cs typeface="+mn-cs"/>
               </a:rPr>
-              <a:t>The second metadata example (the Excel table) contains two other types of public IDs. Can you find them? Can you find the meaning behind those Ids?</a:t>
+              <a:t>What can you do if there are no metadata standards defined for your data / field of research?</a:t>
             </a:r>
           </a:p>
           <a:p>
@@ -1503,10 +1532,12 @@
                 <a:ea typeface="+mn-ea"/>
                 <a:cs typeface="+mn-cs"/>
               </a:rPr>
-              <a:t>The metadata example contains genes IDs from The Arabidopsis Information Resource </a:t>
-            </a:r>
-            <a:r>
-              <a:rPr lang="en-GB" sz="1200" b="0" i="0" u="none" strike="noStrike" kern="1200" dirty="0">
+              <a:t>Think about the minimum information that someone else (from your lab or from any other lab in the world) would need to know about your dataset to be able to work with it without any further inputs from you.</a:t>
+            </a:r>
+          </a:p>
+          <a:p>
+            <a:r>
+              <a:rPr lang="en-GB" sz="1200" b="1" i="0" kern="1200" dirty="0">
                 <a:solidFill>
                   <a:schemeClr val="tx1"/>
                 </a:solidFill>
@@ -1514,9 +1545,8 @@
                 <a:latin typeface="+mn-lt"/>
                 <a:ea typeface="+mn-ea"/>
                 <a:cs typeface="+mn-cs"/>
-                <a:hlinkClick r:id="rId3"/>
-              </a:rPr>
-              <a:t>TAIR</a:t>
+              </a:rPr>
+              <a:t>Think as a consumer</a:t>
             </a:r>
             <a:r>
               <a:rPr lang="en-GB" sz="1200" b="0" i="0" kern="1200" dirty="0">
@@ -1528,30 +1558,8 @@
                 <a:ea typeface="+mn-ea"/>
                 <a:cs typeface="+mn-cs"/>
               </a:rPr>
-              <a:t> and metabolites IDs from </a:t>
-            </a:r>
-            <a:r>
-              <a:rPr lang="en-GB" sz="1200" b="0" i="0" u="none" strike="noStrike" kern="1200" dirty="0">
-                <a:solidFill>
-                  <a:schemeClr val="tx1"/>
-                </a:solidFill>
-                <a:effectLst/>
-                <a:latin typeface="+mn-lt"/>
-                <a:ea typeface="+mn-ea"/>
-                <a:cs typeface="+mn-cs"/>
-                <a:hlinkClick r:id="rId4"/>
-              </a:rPr>
-              <a:t>KEGG</a:t>
-            </a:r>
-            <a:endParaRPr lang="en-GB" sz="1200" b="0" i="0" u="none" strike="noStrike" kern="1200" dirty="0">
-              <a:solidFill>
-                <a:schemeClr val="tx1"/>
-              </a:solidFill>
-              <a:effectLst/>
-              <a:latin typeface="+mn-lt"/>
-              <a:ea typeface="+mn-ea"/>
-              <a:cs typeface="+mn-cs"/>
-            </a:endParaRPr>
+              <a:t> of your data not the producer!</a:t>
+            </a:r>
           </a:p>
           <a:p>
             <a:endParaRPr lang="en-GB" dirty="0"/>
@@ -1584,7 +1592,7 @@
     </p:spTree>
     <p:extLst>
       <p:ext uri="{BB962C8B-B14F-4D97-AF65-F5344CB8AC3E}">
-        <p14:creationId xmlns:p14="http://schemas.microsoft.com/office/powerpoint/2010/main" val="1541303431"/>
+        <p14:creationId xmlns:p14="http://schemas.microsoft.com/office/powerpoint/2010/main" val="1629634170"/>
       </p:ext>
     </p:extLst>
   </p:cSld>
@@ -1648,50 +1656,8 @@
                 <a:ea typeface="+mn-ea"/>
                 <a:cs typeface="+mn-cs"/>
               </a:rPr>
-              <a:t>What can you do if there are no metadata standards defined for your data / field of research?</a:t>
-            </a:r>
-          </a:p>
-          <a:p>
-            <a:r>
-              <a:rPr lang="en-GB" sz="1200" b="0" i="0" kern="1200" dirty="0">
-                <a:solidFill>
-                  <a:schemeClr val="tx1"/>
-                </a:solidFill>
-                <a:effectLst/>
-                <a:latin typeface="+mn-lt"/>
-                <a:ea typeface="+mn-ea"/>
-                <a:cs typeface="+mn-cs"/>
-              </a:rPr>
-              <a:t>Think about the minimum information that someone else (from your lab or from any other lab in the world) would need to know about your dataset to be able to work with it without any further inputs from you.</a:t>
-            </a:r>
-          </a:p>
-          <a:p>
-            <a:r>
-              <a:rPr lang="en-GB" sz="1200" b="1" i="0" kern="1200" dirty="0">
-                <a:solidFill>
-                  <a:schemeClr val="tx1"/>
-                </a:solidFill>
-                <a:effectLst/>
-                <a:latin typeface="+mn-lt"/>
-                <a:ea typeface="+mn-ea"/>
-                <a:cs typeface="+mn-cs"/>
-              </a:rPr>
-              <a:t>Think as a consumer</a:t>
-            </a:r>
-            <a:r>
-              <a:rPr lang="en-GB" sz="1200" b="0" i="0" kern="1200" dirty="0">
-                <a:solidFill>
-                  <a:schemeClr val="tx1"/>
-                </a:solidFill>
-                <a:effectLst/>
-                <a:latin typeface="+mn-lt"/>
-                <a:ea typeface="+mn-ea"/>
-                <a:cs typeface="+mn-cs"/>
-              </a:rPr>
-              <a:t> of your data not the producer!</a:t>
-            </a:r>
-          </a:p>
-          <a:p>
+              <a:t>In groups, identify different types of metadata (administrative, descriptive, structural) present in this example.</a:t>
+            </a:r>
             <a:endParaRPr lang="en-GB" dirty="0"/>
           </a:p>
         </p:txBody>
@@ -1722,7 +1688,421 @@
     </p:spTree>
     <p:extLst>
       <p:ext uri="{BB962C8B-B14F-4D97-AF65-F5344CB8AC3E}">
+        <p14:creationId xmlns:p14="http://schemas.microsoft.com/office/powerpoint/2010/main" val="688198813"/>
+      </p:ext>
+    </p:extLst>
+  </p:cSld>
+  <p:clrMapOvr>
+    <a:masterClrMapping/>
+  </p:clrMapOvr>
+</p:notes>
+</file>
+
+<file path=ppt/notesSlides/notesSlide7.xml><?xml version="1.0" encoding="utf-8"?>
+<p:notes xmlns:a="http://schemas.openxmlformats.org/drawingml/2006/main" xmlns:r="http://schemas.openxmlformats.org/officeDocument/2006/relationships" xmlns:p="http://schemas.openxmlformats.org/presentationml/2006/main">
+  <p:cSld>
+    <p:spTree>
+      <p:nvGrpSpPr>
+        <p:cNvPr id="1" name=""/>
+        <p:cNvGrpSpPr/>
+        <p:nvPr/>
+      </p:nvGrpSpPr>
+      <p:grpSpPr>
+        <a:xfrm>
+          <a:off x="0" y="0"/>
+          <a:ext cx="0" cy="0"/>
+          <a:chOff x="0" y="0"/>
+          <a:chExt cx="0" cy="0"/>
+        </a:xfrm>
+      </p:grpSpPr>
+      <p:sp>
+        <p:nvSpPr>
+          <p:cNvPr id="2" name="Slide Image Placeholder 1"/>
+          <p:cNvSpPr>
+            <a:spLocks noGrp="1" noRot="1" noChangeAspect="1"/>
+          </p:cNvSpPr>
+          <p:nvPr>
+            <p:ph type="sldImg"/>
+          </p:nvPr>
+        </p:nvSpPr>
+        <p:spPr/>
+      </p:sp>
+      <p:sp>
+        <p:nvSpPr>
+          <p:cNvPr id="3" name="Notes Placeholder 2"/>
+          <p:cNvSpPr>
+            <a:spLocks noGrp="1"/>
+          </p:cNvSpPr>
+          <p:nvPr>
+            <p:ph type="body" idx="1"/>
+          </p:nvPr>
+        </p:nvSpPr>
+        <p:spPr/>
+        <p:txBody>
+          <a:bodyPr/>
+          <a:lstStyle/>
+          <a:p>
+            <a:r>
+              <a:rPr lang="en-GB" sz="1200" b="0" i="0" kern="1200" dirty="0">
+                <a:solidFill>
+                  <a:schemeClr val="tx1"/>
+                </a:solidFill>
+                <a:effectLst/>
+                <a:latin typeface="+mn-lt"/>
+                <a:ea typeface="+mn-ea"/>
+                <a:cs typeface="+mn-cs"/>
+              </a:rPr>
+              <a:t>What can you do if there are no metadata standards defined for your data / field of research?</a:t>
+            </a:r>
+          </a:p>
+          <a:p>
+            <a:r>
+              <a:rPr lang="en-GB" sz="1200" b="0" i="0" kern="1200" dirty="0">
+                <a:solidFill>
+                  <a:schemeClr val="tx1"/>
+                </a:solidFill>
+                <a:effectLst/>
+                <a:latin typeface="+mn-lt"/>
+                <a:ea typeface="+mn-ea"/>
+                <a:cs typeface="+mn-cs"/>
+              </a:rPr>
+              <a:t>Think about the minimum information that someone else (from your lab or from any other lab in the world) would need to know about your dataset to be able to work with it without any further inputs from you.</a:t>
+            </a:r>
+          </a:p>
+          <a:p>
+            <a:r>
+              <a:rPr lang="en-GB" sz="1200" b="1" i="0" kern="1200" dirty="0">
+                <a:solidFill>
+                  <a:schemeClr val="tx1"/>
+                </a:solidFill>
+                <a:effectLst/>
+                <a:latin typeface="+mn-lt"/>
+                <a:ea typeface="+mn-ea"/>
+                <a:cs typeface="+mn-cs"/>
+              </a:rPr>
+              <a:t>Think as a consumer</a:t>
+            </a:r>
+            <a:r>
+              <a:rPr lang="en-GB" sz="1200" b="0" i="0" kern="1200" dirty="0">
+                <a:solidFill>
+                  <a:schemeClr val="tx1"/>
+                </a:solidFill>
+                <a:effectLst/>
+                <a:latin typeface="+mn-lt"/>
+                <a:ea typeface="+mn-ea"/>
+                <a:cs typeface="+mn-cs"/>
+              </a:rPr>
+              <a:t> of your data not the producer!</a:t>
+            </a:r>
+          </a:p>
+          <a:p>
+            <a:endParaRPr lang="en-GB" dirty="0"/>
+          </a:p>
+        </p:txBody>
+      </p:sp>
+      <p:sp>
+        <p:nvSpPr>
+          <p:cNvPr id="4" name="Slide Number Placeholder 3"/>
+          <p:cNvSpPr>
+            <a:spLocks noGrp="1"/>
+          </p:cNvSpPr>
+          <p:nvPr>
+            <p:ph type="sldNum" sz="quarter" idx="5"/>
+          </p:nvPr>
+        </p:nvSpPr>
+        <p:spPr/>
+        <p:txBody>
+          <a:bodyPr/>
+          <a:lstStyle/>
+          <a:p>
+            <a:fld id="{CCB04583-82FC-EB4C-9DD9-0626DE3C6BC2}" type="slidenum">
+              <a:rPr lang="en-GB" smtClean="0"/>
+              <a:t>10</a:t>
+            </a:fld>
+            <a:endParaRPr lang="en-GB"/>
+          </a:p>
+        </p:txBody>
+      </p:sp>
+    </p:spTree>
+    <p:extLst>
+      <p:ext uri="{BB962C8B-B14F-4D97-AF65-F5344CB8AC3E}">
+        <p14:creationId xmlns:p14="http://schemas.microsoft.com/office/powerpoint/2010/main" val="1320972641"/>
+      </p:ext>
+    </p:extLst>
+  </p:cSld>
+  <p:clrMapOvr>
+    <a:masterClrMapping/>
+  </p:clrMapOvr>
+</p:notes>
+</file>
+
+<file path=ppt/notesSlides/notesSlide8.xml><?xml version="1.0" encoding="utf-8"?>
+<p:notes xmlns:a="http://schemas.openxmlformats.org/drawingml/2006/main" xmlns:r="http://schemas.openxmlformats.org/officeDocument/2006/relationships" xmlns:p="http://schemas.openxmlformats.org/presentationml/2006/main">
+  <p:cSld>
+    <p:spTree>
+      <p:nvGrpSpPr>
+        <p:cNvPr id="1" name=""/>
+        <p:cNvGrpSpPr/>
+        <p:nvPr/>
+      </p:nvGrpSpPr>
+      <p:grpSpPr>
+        <a:xfrm>
+          <a:off x="0" y="0"/>
+          <a:ext cx="0" cy="0"/>
+          <a:chOff x="0" y="0"/>
+          <a:chExt cx="0" cy="0"/>
+        </a:xfrm>
+      </p:grpSpPr>
+      <p:sp>
+        <p:nvSpPr>
+          <p:cNvPr id="2" name="Slide Image Placeholder 1"/>
+          <p:cNvSpPr>
+            <a:spLocks noGrp="1" noRot="1" noChangeAspect="1"/>
+          </p:cNvSpPr>
+          <p:nvPr>
+            <p:ph type="sldImg"/>
+          </p:nvPr>
+        </p:nvSpPr>
+        <p:spPr/>
+      </p:sp>
+      <p:sp>
+        <p:nvSpPr>
+          <p:cNvPr id="3" name="Notes Placeholder 2"/>
+          <p:cNvSpPr>
+            <a:spLocks noGrp="1"/>
+          </p:cNvSpPr>
+          <p:nvPr>
+            <p:ph type="body" idx="1"/>
+          </p:nvPr>
+        </p:nvSpPr>
+        <p:spPr/>
+        <p:txBody>
+          <a:bodyPr/>
+          <a:lstStyle/>
+          <a:p>
+            <a:r>
+              <a:rPr lang="en-GB" sz="1200" b="0" i="0" kern="1200" dirty="0">
+                <a:solidFill>
+                  <a:schemeClr val="tx1"/>
+                </a:solidFill>
+                <a:effectLst/>
+                <a:latin typeface="+mn-lt"/>
+                <a:ea typeface="+mn-ea"/>
+                <a:cs typeface="+mn-cs"/>
+              </a:rPr>
+              <a:t>What can you do if there are no metadata standards defined for your data / field of research?</a:t>
+            </a:r>
+          </a:p>
+          <a:p>
+            <a:r>
+              <a:rPr lang="en-GB" sz="1200" b="0" i="0" kern="1200" dirty="0">
+                <a:solidFill>
+                  <a:schemeClr val="tx1"/>
+                </a:solidFill>
+                <a:effectLst/>
+                <a:latin typeface="+mn-lt"/>
+                <a:ea typeface="+mn-ea"/>
+                <a:cs typeface="+mn-cs"/>
+              </a:rPr>
+              <a:t>Think about the minimum information that someone else (from your lab or from any other lab in the world) would need to know about your dataset to be able to work with it without any further inputs from you.</a:t>
+            </a:r>
+          </a:p>
+          <a:p>
+            <a:r>
+              <a:rPr lang="en-GB" sz="1200" b="1" i="0" kern="1200" dirty="0">
+                <a:solidFill>
+                  <a:schemeClr val="tx1"/>
+                </a:solidFill>
+                <a:effectLst/>
+                <a:latin typeface="+mn-lt"/>
+                <a:ea typeface="+mn-ea"/>
+                <a:cs typeface="+mn-cs"/>
+              </a:rPr>
+              <a:t>Think as a consumer</a:t>
+            </a:r>
+            <a:r>
+              <a:rPr lang="en-GB" sz="1200" b="0" i="0" kern="1200" dirty="0">
+                <a:solidFill>
+                  <a:schemeClr val="tx1"/>
+                </a:solidFill>
+                <a:effectLst/>
+                <a:latin typeface="+mn-lt"/>
+                <a:ea typeface="+mn-ea"/>
+                <a:cs typeface="+mn-cs"/>
+              </a:rPr>
+              <a:t> of your data not the producer!</a:t>
+            </a:r>
+          </a:p>
+          <a:p>
+            <a:endParaRPr lang="en-GB" dirty="0"/>
+          </a:p>
+        </p:txBody>
+      </p:sp>
+      <p:sp>
+        <p:nvSpPr>
+          <p:cNvPr id="4" name="Slide Number Placeholder 3"/>
+          <p:cNvSpPr>
+            <a:spLocks noGrp="1"/>
+          </p:cNvSpPr>
+          <p:nvPr>
+            <p:ph type="sldNum" sz="quarter" idx="5"/>
+          </p:nvPr>
+        </p:nvSpPr>
+        <p:spPr/>
+        <p:txBody>
+          <a:bodyPr/>
+          <a:lstStyle/>
+          <a:p>
+            <a:fld id="{CCB04583-82FC-EB4C-9DD9-0626DE3C6BC2}" type="slidenum">
+              <a:rPr lang="en-GB" smtClean="0"/>
+              <a:t>11</a:t>
+            </a:fld>
+            <a:endParaRPr lang="en-GB"/>
+          </a:p>
+        </p:txBody>
+      </p:sp>
+    </p:spTree>
+    <p:extLst>
+      <p:ext uri="{BB962C8B-B14F-4D97-AF65-F5344CB8AC3E}">
         <p14:creationId xmlns:p14="http://schemas.microsoft.com/office/powerpoint/2010/main" val="616882971"/>
+      </p:ext>
+    </p:extLst>
+  </p:cSld>
+  <p:clrMapOvr>
+    <a:masterClrMapping/>
+  </p:clrMapOvr>
+</p:notes>
+</file>
+
+<file path=ppt/notesSlides/notesSlide9.xml><?xml version="1.0" encoding="utf-8"?>
+<p:notes xmlns:a="http://schemas.openxmlformats.org/drawingml/2006/main" xmlns:r="http://schemas.openxmlformats.org/officeDocument/2006/relationships" xmlns:p="http://schemas.openxmlformats.org/presentationml/2006/main">
+  <p:cSld>
+    <p:spTree>
+      <p:nvGrpSpPr>
+        <p:cNvPr id="1" name=""/>
+        <p:cNvGrpSpPr/>
+        <p:nvPr/>
+      </p:nvGrpSpPr>
+      <p:grpSpPr>
+        <a:xfrm>
+          <a:off x="0" y="0"/>
+          <a:ext cx="0" cy="0"/>
+          <a:chOff x="0" y="0"/>
+          <a:chExt cx="0" cy="0"/>
+        </a:xfrm>
+      </p:grpSpPr>
+      <p:sp>
+        <p:nvSpPr>
+          <p:cNvPr id="2" name="Slide Image Placeholder 1"/>
+          <p:cNvSpPr>
+            <a:spLocks noGrp="1" noRot="1" noChangeAspect="1"/>
+          </p:cNvSpPr>
+          <p:nvPr>
+            <p:ph type="sldImg"/>
+          </p:nvPr>
+        </p:nvSpPr>
+        <p:spPr/>
+      </p:sp>
+      <p:sp>
+        <p:nvSpPr>
+          <p:cNvPr id="3" name="Notes Placeholder 2"/>
+          <p:cNvSpPr>
+            <a:spLocks noGrp="1"/>
+          </p:cNvSpPr>
+          <p:nvPr>
+            <p:ph type="body" idx="1"/>
+          </p:nvPr>
+        </p:nvSpPr>
+        <p:spPr/>
+        <p:txBody>
+          <a:bodyPr/>
+          <a:lstStyle/>
+          <a:p>
+            <a:r>
+              <a:rPr lang="en-GB" sz="1200" b="0" i="0" kern="1200" dirty="0">
+                <a:solidFill>
+                  <a:schemeClr val="tx1"/>
+                </a:solidFill>
+                <a:effectLst/>
+                <a:latin typeface="+mn-lt"/>
+                <a:ea typeface="+mn-ea"/>
+                <a:cs typeface="+mn-cs"/>
+              </a:rPr>
+              <a:t>What can you do if there are no metadata standards defined for your data / field of research?</a:t>
+            </a:r>
+          </a:p>
+          <a:p>
+            <a:r>
+              <a:rPr lang="en-GB" sz="1200" b="0" i="0" kern="1200" dirty="0">
+                <a:solidFill>
+                  <a:schemeClr val="tx1"/>
+                </a:solidFill>
+                <a:effectLst/>
+                <a:latin typeface="+mn-lt"/>
+                <a:ea typeface="+mn-ea"/>
+                <a:cs typeface="+mn-cs"/>
+              </a:rPr>
+              <a:t>Think about the minimum information that someone else (from your lab or from any other lab in the world) would need to know about your dataset to be able to work with it without any further inputs from you.</a:t>
+            </a:r>
+          </a:p>
+          <a:p>
+            <a:r>
+              <a:rPr lang="en-GB" sz="1200" b="1" i="0" kern="1200" dirty="0">
+                <a:solidFill>
+                  <a:schemeClr val="tx1"/>
+                </a:solidFill>
+                <a:effectLst/>
+                <a:latin typeface="+mn-lt"/>
+                <a:ea typeface="+mn-ea"/>
+                <a:cs typeface="+mn-cs"/>
+              </a:rPr>
+              <a:t>Think as a consumer</a:t>
+            </a:r>
+            <a:r>
+              <a:rPr lang="en-GB" sz="1200" b="0" i="0" kern="1200" dirty="0">
+                <a:solidFill>
+                  <a:schemeClr val="tx1"/>
+                </a:solidFill>
+                <a:effectLst/>
+                <a:latin typeface="+mn-lt"/>
+                <a:ea typeface="+mn-ea"/>
+                <a:cs typeface="+mn-cs"/>
+              </a:rPr>
+              <a:t> of your data not the producer!</a:t>
+            </a:r>
+          </a:p>
+          <a:p>
+            <a:endParaRPr lang="en-GB" dirty="0"/>
+          </a:p>
+        </p:txBody>
+      </p:sp>
+      <p:sp>
+        <p:nvSpPr>
+          <p:cNvPr id="4" name="Slide Number Placeholder 3"/>
+          <p:cNvSpPr>
+            <a:spLocks noGrp="1"/>
+          </p:cNvSpPr>
+          <p:nvPr>
+            <p:ph type="sldNum" sz="quarter" idx="5"/>
+          </p:nvPr>
+        </p:nvSpPr>
+        <p:spPr/>
+        <p:txBody>
+          <a:bodyPr/>
+          <a:lstStyle/>
+          <a:p>
+            <a:fld id="{CCB04583-82FC-EB4C-9DD9-0626DE3C6BC2}" type="slidenum">
+              <a:rPr lang="en-GB" smtClean="0"/>
+              <a:t>12</a:t>
+            </a:fld>
+            <a:endParaRPr lang="en-GB"/>
+          </a:p>
+        </p:txBody>
+      </p:sp>
+    </p:spTree>
+    <p:extLst>
+      <p:ext uri="{BB962C8B-B14F-4D97-AF65-F5344CB8AC3E}">
+        <p14:creationId xmlns:p14="http://schemas.microsoft.com/office/powerpoint/2010/main" val="2789846474"/>
       </p:ext>
     </p:extLst>
   </p:cSld>
@@ -1881,7 +2261,7 @@
           <a:p>
             <a:fld id="{5913FB77-D8DB-4AB9-8EA5-EE8C3B57A5E1}" type="datetimeFigureOut">
               <a:rPr lang="en-GB" smtClean="0"/>
-              <a:t>17/06/2021</a:t>
+              <a:t>06/10/2021</a:t>
             </a:fld>
             <a:endParaRPr lang="en-GB"/>
           </a:p>
@@ -2081,7 +2461,7 @@
           <a:p>
             <a:fld id="{5913FB77-D8DB-4AB9-8EA5-EE8C3B57A5E1}" type="datetimeFigureOut">
               <a:rPr lang="en-GB" smtClean="0"/>
-              <a:t>17/06/2021</a:t>
+              <a:t>06/10/2021</a:t>
             </a:fld>
             <a:endParaRPr lang="en-GB"/>
           </a:p>
@@ -2291,7 +2671,7 @@
           <a:p>
             <a:fld id="{5913FB77-D8DB-4AB9-8EA5-EE8C3B57A5E1}" type="datetimeFigureOut">
               <a:rPr lang="en-GB" smtClean="0"/>
-              <a:t>17/06/2021</a:t>
+              <a:t>06/10/2021</a:t>
             </a:fld>
             <a:endParaRPr lang="en-GB"/>
           </a:p>
@@ -2491,7 +2871,7 @@
           <a:p>
             <a:fld id="{5913FB77-D8DB-4AB9-8EA5-EE8C3B57A5E1}" type="datetimeFigureOut">
               <a:rPr lang="en-GB" smtClean="0"/>
-              <a:t>17/06/2021</a:t>
+              <a:t>06/10/2021</a:t>
             </a:fld>
             <a:endParaRPr lang="en-GB"/>
           </a:p>
@@ -2767,7 +3147,7 @@
           <a:p>
             <a:fld id="{5913FB77-D8DB-4AB9-8EA5-EE8C3B57A5E1}" type="datetimeFigureOut">
               <a:rPr lang="en-GB" smtClean="0"/>
-              <a:t>17/06/2021</a:t>
+              <a:t>06/10/2021</a:t>
             </a:fld>
             <a:endParaRPr lang="en-GB"/>
           </a:p>
@@ -3035,7 +3415,7 @@
           <a:p>
             <a:fld id="{5913FB77-D8DB-4AB9-8EA5-EE8C3B57A5E1}" type="datetimeFigureOut">
               <a:rPr lang="en-GB" smtClean="0"/>
-              <a:t>17/06/2021</a:t>
+              <a:t>06/10/2021</a:t>
             </a:fld>
             <a:endParaRPr lang="en-GB"/>
           </a:p>
@@ -3450,7 +3830,7 @@
           <a:p>
             <a:fld id="{5913FB77-D8DB-4AB9-8EA5-EE8C3B57A5E1}" type="datetimeFigureOut">
               <a:rPr lang="en-GB" smtClean="0"/>
-              <a:t>17/06/2021</a:t>
+              <a:t>06/10/2021</a:t>
             </a:fld>
             <a:endParaRPr lang="en-GB"/>
           </a:p>
@@ -3592,7 +3972,7 @@
           <a:p>
             <a:fld id="{5913FB77-D8DB-4AB9-8EA5-EE8C3B57A5E1}" type="datetimeFigureOut">
               <a:rPr lang="en-GB" smtClean="0"/>
-              <a:t>17/06/2021</a:t>
+              <a:t>06/10/2021</a:t>
             </a:fld>
             <a:endParaRPr lang="en-GB"/>
           </a:p>
@@ -3705,7 +4085,7 @@
           <a:p>
             <a:fld id="{5913FB77-D8DB-4AB9-8EA5-EE8C3B57A5E1}" type="datetimeFigureOut">
               <a:rPr lang="en-GB" smtClean="0"/>
-              <a:t>17/06/2021</a:t>
+              <a:t>06/10/2021</a:t>
             </a:fld>
             <a:endParaRPr lang="en-GB"/>
           </a:p>
@@ -4018,7 +4398,7 @@
           <a:p>
             <a:fld id="{5913FB77-D8DB-4AB9-8EA5-EE8C3B57A5E1}" type="datetimeFigureOut">
               <a:rPr lang="en-GB" smtClean="0"/>
-              <a:t>17/06/2021</a:t>
+              <a:t>06/10/2021</a:t>
             </a:fld>
             <a:endParaRPr lang="en-GB"/>
           </a:p>
@@ -4307,7 +4687,7 @@
           <a:p>
             <a:fld id="{5913FB77-D8DB-4AB9-8EA5-EE8C3B57A5E1}" type="datetimeFigureOut">
               <a:rPr lang="en-GB" smtClean="0"/>
-              <a:t>17/06/2021</a:t>
+              <a:t>06/10/2021</a:t>
             </a:fld>
             <a:endParaRPr lang="en-GB"/>
           </a:p>
@@ -4550,7 +4930,7 @@
           <a:p>
             <a:fld id="{5913FB77-D8DB-4AB9-8EA5-EE8C3B57A5E1}" type="datetimeFigureOut">
               <a:rPr lang="en-GB" smtClean="0"/>
-              <a:t>17/06/2021</a:t>
+              <a:t>06/10/2021</a:t>
             </a:fld>
             <a:endParaRPr lang="en-GB"/>
           </a:p>
@@ -5022,7 +5402,7 @@
           <p:nvPr/>
         </p:nvPicPr>
         <p:blipFill>
-          <a:blip r:embed="rId2">
+          <a:blip r:embed="rId2" cstate="hqprint">
             <a:extLst>
               <a:ext uri="{28A0092B-C50C-407E-A947-70E740481C1C}">
                 <a14:useLocalDpi xmlns:a14="http://schemas.microsoft.com/office/drawing/2010/main" val="0"/>
@@ -5305,6 +5685,812 @@
       </p:grpSpPr>
       <p:sp>
         <p:nvSpPr>
+          <p:cNvPr id="3" name="TextBox 2">
+            <a:extLst>
+              <a:ext uri="{FF2B5EF4-FFF2-40B4-BE49-F238E27FC236}">
+                <a16:creationId xmlns:a16="http://schemas.microsoft.com/office/drawing/2014/main" id="{CC9F008A-0A52-314A-9B20-E8308A46FAC5}"/>
+              </a:ext>
+            </a:extLst>
+          </p:cNvPr>
+          <p:cNvSpPr txBox="1"/>
+          <p:nvPr/>
+        </p:nvSpPr>
+        <p:spPr>
+          <a:xfrm>
+            <a:off x="1135005" y="185352"/>
+            <a:ext cx="9464530" cy="523220"/>
+          </a:xfrm>
+          <a:prstGeom prst="rect">
+            <a:avLst/>
+          </a:prstGeom>
+          <a:noFill/>
+        </p:spPr>
+        <p:txBody>
+          <a:bodyPr wrap="square">
+            <a:spAutoFit/>
+          </a:bodyPr>
+          <a:lstStyle/>
+          <a:p>
+            <a:r>
+              <a:rPr lang="pl-PL" sz="2800" dirty="0" smtClean="0">
+                <a:solidFill>
+                  <a:srgbClr val="0070C0"/>
+                </a:solidFill>
+              </a:rPr>
+              <a:t>What to include in metadata</a:t>
+            </a:r>
+            <a:endParaRPr lang="en-GB" sz="2800" dirty="0">
+              <a:solidFill>
+                <a:srgbClr val="0070C0"/>
+              </a:solidFill>
+            </a:endParaRPr>
+          </a:p>
+        </p:txBody>
+      </p:sp>
+      <p:pic>
+        <p:nvPicPr>
+          <p:cNvPr id="4" name="Picture 2" descr="Ed_DaSH">
+            <a:extLst>
+              <a:ext uri="{FF2B5EF4-FFF2-40B4-BE49-F238E27FC236}">
+                <a16:creationId xmlns:a16="http://schemas.microsoft.com/office/drawing/2014/main" id="{A783256F-E39E-4712-96B0-240BD611CFEB}"/>
+              </a:ext>
+            </a:extLst>
+          </p:cNvPr>
+          <p:cNvPicPr>
+            <a:picLocks noChangeAspect="1" noChangeArrowheads="1"/>
+          </p:cNvPicPr>
+          <p:nvPr/>
+        </p:nvPicPr>
+        <p:blipFill>
+          <a:blip r:embed="rId3" cstate="hqprint">
+            <a:extLst>
+              <a:ext uri="{28A0092B-C50C-407E-A947-70E740481C1C}">
+                <a14:useLocalDpi xmlns:a14="http://schemas.microsoft.com/office/drawing/2010/main" val="0"/>
+              </a:ext>
+            </a:extLst>
+          </a:blip>
+          <a:srcRect/>
+          <a:stretch>
+            <a:fillRect/>
+          </a:stretch>
+        </p:blipFill>
+        <p:spPr bwMode="auto">
+          <a:xfrm>
+            <a:off x="10820670" y="5458691"/>
+            <a:ext cx="1289214" cy="1325418"/>
+          </a:xfrm>
+          <a:prstGeom prst="rect">
+            <a:avLst/>
+          </a:prstGeom>
+          <a:noFill/>
+          <a:extLst>
+            <a:ext uri="{909E8E84-426E-40DD-AFC4-6F175D3DCCD1}">
+              <a14:hiddenFill xmlns:a14="http://schemas.microsoft.com/office/drawing/2010/main">
+                <a:solidFill>
+                  <a:srgbClr val="FFFFFF"/>
+                </a:solidFill>
+              </a14:hiddenFill>
+            </a:ext>
+          </a:extLst>
+        </p:spPr>
+      </p:pic>
+      <p:sp>
+        <p:nvSpPr>
+          <p:cNvPr id="2" name="Rectangle 1"/>
+          <p:cNvSpPr/>
+          <p:nvPr/>
+        </p:nvSpPr>
+        <p:spPr>
+          <a:xfrm>
+            <a:off x="589085" y="1151792"/>
+            <a:ext cx="10304584" cy="3416320"/>
+          </a:xfrm>
+          <a:prstGeom prst="rect">
+            <a:avLst/>
+          </a:prstGeom>
+        </p:spPr>
+        <p:txBody>
+          <a:bodyPr wrap="square">
+            <a:spAutoFit/>
+          </a:bodyPr>
+          <a:lstStyle/>
+          <a:p>
+            <a:r>
+              <a:rPr lang="en-GB" dirty="0">
+                <a:solidFill>
+                  <a:srgbClr val="0070C0"/>
+                </a:solidFill>
+              </a:rPr>
+              <a:t>The </a:t>
+            </a:r>
+            <a:r>
+              <a:rPr lang="en-GB" b="1" dirty="0">
+                <a:solidFill>
+                  <a:srgbClr val="0070C0"/>
+                </a:solidFill>
+              </a:rPr>
+              <a:t>minimum information standard </a:t>
+            </a:r>
+            <a:endParaRPr lang="pl-PL" b="1" dirty="0" smtClean="0">
+              <a:solidFill>
+                <a:srgbClr val="0070C0"/>
+              </a:solidFill>
+            </a:endParaRPr>
+          </a:p>
+          <a:p>
+            <a:pPr marL="285750" indent="-285750">
+              <a:buFont typeface="Arial" panose="020B0604020202020204" pitchFamily="34" charset="0"/>
+              <a:buChar char="•"/>
+            </a:pPr>
+            <a:r>
+              <a:rPr lang="en-GB" dirty="0" smtClean="0">
+                <a:solidFill>
+                  <a:srgbClr val="0070C0"/>
+                </a:solidFill>
+              </a:rPr>
+              <a:t>set </a:t>
+            </a:r>
+            <a:r>
+              <a:rPr lang="en-GB" dirty="0">
+                <a:solidFill>
+                  <a:srgbClr val="0070C0"/>
+                </a:solidFill>
+              </a:rPr>
+              <a:t>of guidelines for reporting </a:t>
+            </a:r>
+            <a:r>
+              <a:rPr lang="en-GB" dirty="0" smtClean="0">
+                <a:solidFill>
+                  <a:srgbClr val="0070C0"/>
+                </a:solidFill>
+              </a:rPr>
+              <a:t>data </a:t>
+            </a:r>
+            <a:r>
+              <a:rPr lang="en-GB" dirty="0">
+                <a:solidFill>
+                  <a:srgbClr val="0070C0"/>
+                </a:solidFill>
+              </a:rPr>
+              <a:t>derived by relevant methods in </a:t>
+            </a:r>
+            <a:r>
+              <a:rPr lang="en-GB" dirty="0" smtClean="0">
+                <a:solidFill>
+                  <a:srgbClr val="0070C0"/>
+                </a:solidFill>
+              </a:rPr>
+              <a:t>biosciences</a:t>
+            </a:r>
+            <a:endParaRPr lang="pl-PL" dirty="0" smtClean="0">
+              <a:solidFill>
+                <a:srgbClr val="0070C0"/>
+              </a:solidFill>
+            </a:endParaRPr>
+          </a:p>
+          <a:p>
+            <a:pPr marL="285750" indent="-285750">
+              <a:buFont typeface="Arial" panose="020B0604020202020204" pitchFamily="34" charset="0"/>
+              <a:buChar char="•"/>
+            </a:pPr>
+            <a:r>
+              <a:rPr lang="en-GB" dirty="0" smtClean="0">
+                <a:solidFill>
+                  <a:srgbClr val="0070C0"/>
+                </a:solidFill>
+              </a:rPr>
+              <a:t>ensures </a:t>
+            </a:r>
+            <a:r>
+              <a:rPr lang="en-GB" dirty="0">
+                <a:solidFill>
+                  <a:srgbClr val="0070C0"/>
+                </a:solidFill>
+              </a:rPr>
+              <a:t>that the data can be easily verified</a:t>
+            </a:r>
+            <a:r>
+              <a:rPr lang="en-GB" dirty="0" smtClean="0">
+                <a:solidFill>
+                  <a:srgbClr val="0070C0"/>
+                </a:solidFill>
+              </a:rPr>
+              <a:t>, </a:t>
+            </a:r>
+            <a:r>
+              <a:rPr lang="en-GB" dirty="0">
+                <a:solidFill>
+                  <a:srgbClr val="0070C0"/>
+                </a:solidFill>
+              </a:rPr>
+              <a:t>analysed and clearly interpreted by the </a:t>
+            </a:r>
+            <a:r>
+              <a:rPr lang="en-GB" dirty="0" smtClean="0">
+                <a:solidFill>
+                  <a:srgbClr val="0070C0"/>
+                </a:solidFill>
+              </a:rPr>
+              <a:t>community.</a:t>
+            </a:r>
+            <a:endParaRPr lang="pl-PL" dirty="0" smtClean="0">
+              <a:solidFill>
+                <a:srgbClr val="0070C0"/>
+              </a:solidFill>
+            </a:endParaRPr>
+          </a:p>
+          <a:p>
+            <a:pPr marL="285750" indent="-285750">
+              <a:buFont typeface="Arial" panose="020B0604020202020204" pitchFamily="34" charset="0"/>
+              <a:buChar char="•"/>
+            </a:pPr>
+            <a:endParaRPr lang="pl-PL" dirty="0">
+              <a:solidFill>
+                <a:srgbClr val="0070C0"/>
+              </a:solidFill>
+            </a:endParaRPr>
+          </a:p>
+          <a:p>
+            <a:pPr marL="285750" indent="-285750">
+              <a:buFont typeface="Arial" panose="020B0604020202020204" pitchFamily="34" charset="0"/>
+              <a:buChar char="•"/>
+            </a:pPr>
+            <a:endParaRPr lang="pl-PL" dirty="0" smtClean="0">
+              <a:solidFill>
+                <a:srgbClr val="0070C0"/>
+              </a:solidFill>
+            </a:endParaRPr>
+          </a:p>
+          <a:p>
+            <a:pPr marL="285750" indent="-285750">
+              <a:buFont typeface="Arial" panose="020B0604020202020204" pitchFamily="34" charset="0"/>
+              <a:buChar char="•"/>
+            </a:pPr>
+            <a:endParaRPr lang="pl-PL" dirty="0" smtClean="0">
+              <a:solidFill>
+                <a:srgbClr val="0070C0"/>
+              </a:solidFill>
+            </a:endParaRPr>
+          </a:p>
+          <a:p>
+            <a:pPr marL="285750" indent="-285750">
+              <a:buFont typeface="Arial" panose="020B0604020202020204" pitchFamily="34" charset="0"/>
+              <a:buChar char="•"/>
+            </a:pPr>
+            <a:endParaRPr lang="pl-PL" dirty="0">
+              <a:solidFill>
+                <a:srgbClr val="0070C0"/>
+              </a:solidFill>
+            </a:endParaRPr>
+          </a:p>
+          <a:p>
+            <a:pPr marL="285750" indent="-285750">
+              <a:buFont typeface="Arial" panose="020B0604020202020204" pitchFamily="34" charset="0"/>
+              <a:buChar char="•"/>
+            </a:pPr>
+            <a:endParaRPr lang="pl-PL" dirty="0">
+              <a:solidFill>
+                <a:srgbClr val="0070C0"/>
+              </a:solidFill>
+            </a:endParaRPr>
+          </a:p>
+          <a:p>
+            <a:r>
+              <a:rPr lang="en-GB" b="1" dirty="0">
+                <a:solidFill>
+                  <a:srgbClr val="0070C0"/>
+                </a:solidFill>
+              </a:rPr>
+              <a:t>Minimum Information for Biological and Biomedical </a:t>
+            </a:r>
+            <a:r>
+              <a:rPr lang="en-GB" b="1" dirty="0" smtClean="0">
+                <a:solidFill>
+                  <a:srgbClr val="0070C0"/>
+                </a:solidFill>
+              </a:rPr>
+              <a:t>Investigations</a:t>
+            </a:r>
+            <a:r>
+              <a:rPr lang="pl-PL" b="1" dirty="0" smtClean="0">
+                <a:solidFill>
+                  <a:srgbClr val="0070C0"/>
+                </a:solidFill>
+              </a:rPr>
+              <a:t> </a:t>
+            </a:r>
+            <a:r>
+              <a:rPr lang="en-GB" b="1" dirty="0" smtClean="0">
+                <a:solidFill>
+                  <a:srgbClr val="0070C0"/>
+                </a:solidFill>
+              </a:rPr>
+              <a:t>(MIBBI)</a:t>
+            </a:r>
+            <a:r>
+              <a:rPr lang="pl-PL" b="1" dirty="0" smtClean="0">
+                <a:solidFill>
+                  <a:srgbClr val="0070C0"/>
+                </a:solidFill>
+              </a:rPr>
+              <a:t> </a:t>
+            </a:r>
+          </a:p>
+          <a:p>
+            <a:r>
+              <a:rPr lang="en-GB" dirty="0" smtClean="0">
+                <a:solidFill>
+                  <a:srgbClr val="0070C0"/>
+                </a:solidFill>
+              </a:rPr>
+              <a:t>is </a:t>
+            </a:r>
+            <a:r>
+              <a:rPr lang="en-GB" dirty="0">
+                <a:solidFill>
+                  <a:srgbClr val="0070C0"/>
+                </a:solidFill>
+              </a:rPr>
+              <a:t>the collection of the most known </a:t>
+            </a:r>
+            <a:r>
+              <a:rPr lang="en-GB" dirty="0" smtClean="0">
+                <a:solidFill>
+                  <a:srgbClr val="0070C0"/>
+                </a:solidFill>
+              </a:rPr>
+              <a:t>standards</a:t>
+            </a:r>
+            <a:r>
+              <a:rPr lang="pl-PL" dirty="0" smtClean="0">
+                <a:solidFill>
+                  <a:srgbClr val="0070C0"/>
+                </a:solidFill>
+              </a:rPr>
+              <a:t>:</a:t>
+            </a:r>
+          </a:p>
+          <a:p>
+            <a:r>
+              <a:rPr lang="pl-PL" dirty="0">
+                <a:solidFill>
+                  <a:srgbClr val="0070C0"/>
+                </a:solidFill>
+              </a:rPr>
+              <a:t>https://fairsharing.org/collection/MIBBI</a:t>
+            </a:r>
+            <a:endParaRPr lang="pl-PL" dirty="0" smtClean="0">
+              <a:solidFill>
+                <a:srgbClr val="0070C0"/>
+              </a:solidFill>
+            </a:endParaRPr>
+          </a:p>
+          <a:p>
+            <a:endParaRPr lang="en-GB" dirty="0">
+              <a:solidFill>
+                <a:srgbClr val="0070C0"/>
+              </a:solidFill>
+            </a:endParaRPr>
+          </a:p>
+        </p:txBody>
+      </p:sp>
+    </p:spTree>
+    <p:extLst>
+      <p:ext uri="{BB962C8B-B14F-4D97-AF65-F5344CB8AC3E}">
+        <p14:creationId xmlns:p14="http://schemas.microsoft.com/office/powerpoint/2010/main" val="1365792642"/>
+      </p:ext>
+    </p:extLst>
+  </p:cSld>
+  <p:clrMapOvr>
+    <a:masterClrMapping/>
+  </p:clrMapOvr>
+</p:sld>
+</file>
+
+<file path=ppt/slides/slide11.xml><?xml version="1.0" encoding="utf-8"?>
+<p:sld xmlns:a="http://schemas.openxmlformats.org/drawingml/2006/main" xmlns:r="http://schemas.openxmlformats.org/officeDocument/2006/relationships" xmlns:p="http://schemas.openxmlformats.org/presentationml/2006/main">
+  <p:cSld>
+    <p:spTree>
+      <p:nvGrpSpPr>
+        <p:cNvPr id="1" name=""/>
+        <p:cNvGrpSpPr/>
+        <p:nvPr/>
+      </p:nvGrpSpPr>
+      <p:grpSpPr>
+        <a:xfrm>
+          <a:off x="0" y="0"/>
+          <a:ext cx="0" cy="0"/>
+          <a:chOff x="0" y="0"/>
+          <a:chExt cx="0" cy="0"/>
+        </a:xfrm>
+      </p:grpSpPr>
+      <p:sp>
+        <p:nvSpPr>
+          <p:cNvPr id="3" name="TextBox 2">
+            <a:extLst>
+              <a:ext uri="{FF2B5EF4-FFF2-40B4-BE49-F238E27FC236}">
+                <a16:creationId xmlns:a16="http://schemas.microsoft.com/office/drawing/2014/main" id="{CC9F008A-0A52-314A-9B20-E8308A46FAC5}"/>
+              </a:ext>
+            </a:extLst>
+          </p:cNvPr>
+          <p:cNvSpPr txBox="1"/>
+          <p:nvPr/>
+        </p:nvSpPr>
+        <p:spPr>
+          <a:xfrm>
+            <a:off x="1135005" y="185352"/>
+            <a:ext cx="9464530" cy="523220"/>
+          </a:xfrm>
+          <a:prstGeom prst="rect">
+            <a:avLst/>
+          </a:prstGeom>
+          <a:noFill/>
+        </p:spPr>
+        <p:txBody>
+          <a:bodyPr wrap="square">
+            <a:spAutoFit/>
+          </a:bodyPr>
+          <a:lstStyle/>
+          <a:p>
+            <a:r>
+              <a:rPr lang="en-GB" sz="2800" dirty="0">
+                <a:solidFill>
+                  <a:srgbClr val="0070C0"/>
+                </a:solidFill>
+              </a:rPr>
+              <a:t>Minimum information </a:t>
+            </a:r>
+            <a:r>
+              <a:rPr lang="pl-PL" sz="2800" dirty="0" smtClean="0">
+                <a:solidFill>
+                  <a:srgbClr val="0070C0"/>
+                </a:solidFill>
+              </a:rPr>
+              <a:t>standards</a:t>
+            </a:r>
+            <a:endParaRPr lang="en-GB" sz="2800" dirty="0">
+              <a:solidFill>
+                <a:srgbClr val="0070C0"/>
+              </a:solidFill>
+            </a:endParaRPr>
+          </a:p>
+        </p:txBody>
+      </p:sp>
+      <p:pic>
+        <p:nvPicPr>
+          <p:cNvPr id="5" name="Picture 4" descr="Graphical user interface, application&#10;&#10;Description automatically generated">
+            <a:extLst>
+              <a:ext uri="{FF2B5EF4-FFF2-40B4-BE49-F238E27FC236}">
+                <a16:creationId xmlns:a16="http://schemas.microsoft.com/office/drawing/2014/main" id="{9BC36440-7734-2147-88B9-EBF47ECA9558}"/>
+              </a:ext>
+            </a:extLst>
+          </p:cNvPr>
+          <p:cNvPicPr>
+            <a:picLocks noChangeAspect="1"/>
+          </p:cNvPicPr>
+          <p:nvPr/>
+        </p:nvPicPr>
+        <p:blipFill rotWithShape="1">
+          <a:blip r:embed="rId3">
+            <a:extLst>
+              <a:ext uri="{28A0092B-C50C-407E-A947-70E740481C1C}">
+                <a14:useLocalDpi xmlns:a14="http://schemas.microsoft.com/office/drawing/2010/main" val="0"/>
+              </a:ext>
+            </a:extLst>
+          </a:blip>
+          <a:srcRect r="16110" b="34570"/>
+          <a:stretch/>
+        </p:blipFill>
+        <p:spPr>
+          <a:xfrm>
+            <a:off x="205997" y="1069817"/>
+            <a:ext cx="11780005" cy="5184228"/>
+          </a:xfrm>
+          <a:prstGeom prst="rect">
+            <a:avLst/>
+          </a:prstGeom>
+        </p:spPr>
+      </p:pic>
+      <p:pic>
+        <p:nvPicPr>
+          <p:cNvPr id="4" name="Picture 2" descr="Ed_DaSH">
+            <a:extLst>
+              <a:ext uri="{FF2B5EF4-FFF2-40B4-BE49-F238E27FC236}">
+                <a16:creationId xmlns:a16="http://schemas.microsoft.com/office/drawing/2014/main" id="{A783256F-E39E-4712-96B0-240BD611CFEB}"/>
+              </a:ext>
+            </a:extLst>
+          </p:cNvPr>
+          <p:cNvPicPr>
+            <a:picLocks noChangeAspect="1" noChangeArrowheads="1"/>
+          </p:cNvPicPr>
+          <p:nvPr/>
+        </p:nvPicPr>
+        <p:blipFill>
+          <a:blip r:embed="rId4" cstate="hqprint">
+            <a:extLst>
+              <a:ext uri="{28A0092B-C50C-407E-A947-70E740481C1C}">
+                <a14:useLocalDpi xmlns:a14="http://schemas.microsoft.com/office/drawing/2010/main" val="0"/>
+              </a:ext>
+            </a:extLst>
+          </a:blip>
+          <a:srcRect/>
+          <a:stretch>
+            <a:fillRect/>
+          </a:stretch>
+        </p:blipFill>
+        <p:spPr bwMode="auto">
+          <a:xfrm>
+            <a:off x="10820670" y="5458691"/>
+            <a:ext cx="1289214" cy="1325418"/>
+          </a:xfrm>
+          <a:prstGeom prst="rect">
+            <a:avLst/>
+          </a:prstGeom>
+          <a:noFill/>
+          <a:extLst>
+            <a:ext uri="{909E8E84-426E-40DD-AFC4-6F175D3DCCD1}">
+              <a14:hiddenFill xmlns:a14="http://schemas.microsoft.com/office/drawing/2010/main">
+                <a:solidFill>
+                  <a:srgbClr val="FFFFFF"/>
+                </a:solidFill>
+              </a14:hiddenFill>
+            </a:ext>
+          </a:extLst>
+        </p:spPr>
+      </p:pic>
+    </p:spTree>
+    <p:extLst>
+      <p:ext uri="{BB962C8B-B14F-4D97-AF65-F5344CB8AC3E}">
+        <p14:creationId xmlns:p14="http://schemas.microsoft.com/office/powerpoint/2010/main" val="2535871180"/>
+      </p:ext>
+    </p:extLst>
+  </p:cSld>
+  <p:clrMapOvr>
+    <a:masterClrMapping/>
+  </p:clrMapOvr>
+</p:sld>
+</file>
+
+<file path=ppt/slides/slide12.xml><?xml version="1.0" encoding="utf-8"?>
+<p:sld xmlns:a="http://schemas.openxmlformats.org/drawingml/2006/main" xmlns:r="http://schemas.openxmlformats.org/officeDocument/2006/relationships" xmlns:p="http://schemas.openxmlformats.org/presentationml/2006/main">
+  <p:cSld>
+    <p:spTree>
+      <p:nvGrpSpPr>
+        <p:cNvPr id="1" name=""/>
+        <p:cNvGrpSpPr/>
+        <p:nvPr/>
+      </p:nvGrpSpPr>
+      <p:grpSpPr>
+        <a:xfrm>
+          <a:off x="0" y="0"/>
+          <a:ext cx="0" cy="0"/>
+          <a:chOff x="0" y="0"/>
+          <a:chExt cx="0" cy="0"/>
+        </a:xfrm>
+      </p:grpSpPr>
+      <p:sp>
+        <p:nvSpPr>
+          <p:cNvPr id="3" name="TextBox 2">
+            <a:extLst>
+              <a:ext uri="{FF2B5EF4-FFF2-40B4-BE49-F238E27FC236}">
+                <a16:creationId xmlns:a16="http://schemas.microsoft.com/office/drawing/2014/main" id="{CC9F008A-0A52-314A-9B20-E8308A46FAC5}"/>
+              </a:ext>
+            </a:extLst>
+          </p:cNvPr>
+          <p:cNvSpPr txBox="1"/>
+          <p:nvPr/>
+        </p:nvSpPr>
+        <p:spPr>
+          <a:xfrm>
+            <a:off x="1135005" y="185352"/>
+            <a:ext cx="9464530" cy="523220"/>
+          </a:xfrm>
+          <a:prstGeom prst="rect">
+            <a:avLst/>
+          </a:prstGeom>
+          <a:noFill/>
+        </p:spPr>
+        <p:txBody>
+          <a:bodyPr wrap="square">
+            <a:spAutoFit/>
+          </a:bodyPr>
+          <a:lstStyle/>
+          <a:p>
+            <a:r>
+              <a:rPr lang="en-GB" sz="2800" dirty="0" smtClean="0">
+                <a:solidFill>
+                  <a:srgbClr val="0070C0"/>
+                </a:solidFill>
+              </a:rPr>
+              <a:t>Exercise</a:t>
+            </a:r>
+            <a:r>
+              <a:rPr lang="pl-PL" sz="2800" dirty="0" smtClean="0">
+                <a:solidFill>
+                  <a:srgbClr val="0070C0"/>
+                </a:solidFill>
+              </a:rPr>
+              <a:t>: </a:t>
+            </a:r>
+            <a:r>
+              <a:rPr lang="pl-PL" sz="2800" dirty="0" smtClean="0">
+                <a:solidFill>
+                  <a:srgbClr val="0070C0"/>
+                </a:solidFill>
+              </a:rPr>
+              <a:t>Minimal information example</a:t>
+            </a:r>
+            <a:endParaRPr lang="en-GB" sz="2800" dirty="0">
+              <a:solidFill>
+                <a:srgbClr val="0070C0"/>
+              </a:solidFill>
+            </a:endParaRPr>
+          </a:p>
+        </p:txBody>
+      </p:sp>
+      <p:pic>
+        <p:nvPicPr>
+          <p:cNvPr id="4" name="Picture 2" descr="Ed_DaSH">
+            <a:extLst>
+              <a:ext uri="{FF2B5EF4-FFF2-40B4-BE49-F238E27FC236}">
+                <a16:creationId xmlns:a16="http://schemas.microsoft.com/office/drawing/2014/main" id="{A783256F-E39E-4712-96B0-240BD611CFEB}"/>
+              </a:ext>
+            </a:extLst>
+          </p:cNvPr>
+          <p:cNvPicPr>
+            <a:picLocks noChangeAspect="1" noChangeArrowheads="1"/>
+          </p:cNvPicPr>
+          <p:nvPr/>
+        </p:nvPicPr>
+        <p:blipFill>
+          <a:blip r:embed="rId3" cstate="hqprint">
+            <a:extLst>
+              <a:ext uri="{28A0092B-C50C-407E-A947-70E740481C1C}">
+                <a14:useLocalDpi xmlns:a14="http://schemas.microsoft.com/office/drawing/2010/main" val="0"/>
+              </a:ext>
+            </a:extLst>
+          </a:blip>
+          <a:srcRect/>
+          <a:stretch>
+            <a:fillRect/>
+          </a:stretch>
+        </p:blipFill>
+        <p:spPr bwMode="auto">
+          <a:xfrm>
+            <a:off x="10820670" y="5458691"/>
+            <a:ext cx="1289214" cy="1325418"/>
+          </a:xfrm>
+          <a:prstGeom prst="rect">
+            <a:avLst/>
+          </a:prstGeom>
+          <a:noFill/>
+          <a:extLst>
+            <a:ext uri="{909E8E84-426E-40DD-AFC4-6F175D3DCCD1}">
+              <a14:hiddenFill xmlns:a14="http://schemas.microsoft.com/office/drawing/2010/main">
+                <a:solidFill>
+                  <a:srgbClr val="FFFFFF"/>
+                </a:solidFill>
+              </a14:hiddenFill>
+            </a:ext>
+          </a:extLst>
+        </p:spPr>
+      </p:pic>
+      <p:sp>
+        <p:nvSpPr>
+          <p:cNvPr id="2" name="Rectangle 1"/>
+          <p:cNvSpPr/>
+          <p:nvPr/>
+        </p:nvSpPr>
+        <p:spPr>
+          <a:xfrm>
+            <a:off x="589085" y="1151792"/>
+            <a:ext cx="10304584" cy="1477328"/>
+          </a:xfrm>
+          <a:prstGeom prst="rect">
+            <a:avLst/>
+          </a:prstGeom>
+        </p:spPr>
+        <p:txBody>
+          <a:bodyPr wrap="square">
+            <a:spAutoFit/>
+          </a:bodyPr>
+          <a:lstStyle/>
+          <a:p>
+            <a:endParaRPr lang="pl-PL" dirty="0" smtClean="0">
+              <a:solidFill>
+                <a:srgbClr val="0070C0"/>
+              </a:solidFill>
+            </a:endParaRPr>
+          </a:p>
+          <a:p>
+            <a:r>
+              <a:rPr lang="en-GB" dirty="0" smtClean="0">
+                <a:solidFill>
+                  <a:srgbClr val="0070C0"/>
+                </a:solidFill>
+              </a:rPr>
+              <a:t>Minimum </a:t>
+            </a:r>
+            <a:r>
+              <a:rPr lang="en-GB" dirty="0">
+                <a:solidFill>
+                  <a:srgbClr val="0070C0"/>
+                </a:solidFill>
+              </a:rPr>
+              <a:t>Information about a Neuroscience Investigation (MINI) Electrophysiology</a:t>
+            </a:r>
+            <a:endParaRPr lang="pl-PL" dirty="0">
+              <a:solidFill>
+                <a:srgbClr val="0070C0"/>
+              </a:solidFill>
+            </a:endParaRPr>
+          </a:p>
+          <a:p>
+            <a:pPr marL="285750" indent="-285750">
+              <a:buFont typeface="Arial" panose="020B0604020202020204" pitchFamily="34" charset="0"/>
+              <a:buChar char="•"/>
+            </a:pPr>
+            <a:endParaRPr lang="pl-PL" dirty="0" smtClean="0">
+              <a:solidFill>
+                <a:srgbClr val="0070C0"/>
+              </a:solidFill>
+            </a:endParaRPr>
+          </a:p>
+          <a:p>
+            <a:pPr marL="285750" indent="-285750">
+              <a:buFont typeface="Arial" panose="020B0604020202020204" pitchFamily="34" charset="0"/>
+              <a:buChar char="•"/>
+            </a:pPr>
+            <a:endParaRPr lang="pl-PL" dirty="0" smtClean="0">
+              <a:solidFill>
+                <a:srgbClr val="0070C0"/>
+              </a:solidFill>
+            </a:endParaRPr>
+          </a:p>
+          <a:p>
+            <a:r>
+              <a:rPr lang="en-GB" dirty="0">
+                <a:solidFill>
+                  <a:srgbClr val="0070C0"/>
+                </a:solidFill>
+              </a:rPr>
+              <a:t>https://www.nature.com/articles/npre.2008.1720.1.pdf</a:t>
+            </a:r>
+          </a:p>
+        </p:txBody>
+      </p:sp>
+    </p:spTree>
+    <p:extLst>
+      <p:ext uri="{BB962C8B-B14F-4D97-AF65-F5344CB8AC3E}">
+        <p14:creationId xmlns:p14="http://schemas.microsoft.com/office/powerpoint/2010/main" val="3633137735"/>
+      </p:ext>
+    </p:extLst>
+  </p:cSld>
+  <p:clrMapOvr>
+    <a:masterClrMapping/>
+  </p:clrMapOvr>
+</p:sld>
+</file>
+
+<file path=ppt/slides/slide13.xml><?xml version="1.0" encoding="utf-8"?>
+<p:sld xmlns:a="http://schemas.openxmlformats.org/drawingml/2006/main" xmlns:r="http://schemas.openxmlformats.org/officeDocument/2006/relationships" xmlns:p="http://schemas.openxmlformats.org/presentationml/2006/main">
+  <p:cSld>
+    <p:spTree>
+      <p:nvGrpSpPr>
+        <p:cNvPr id="1" name=""/>
+        <p:cNvGrpSpPr/>
+        <p:nvPr/>
+      </p:nvGrpSpPr>
+      <p:grpSpPr>
+        <a:xfrm>
+          <a:off x="0" y="0"/>
+          <a:ext cx="0" cy="0"/>
+          <a:chOff x="0" y="0"/>
+          <a:chExt cx="0" cy="0"/>
+        </a:xfrm>
+      </p:grpSpPr>
+      <p:sp>
+        <p:nvSpPr>
           <p:cNvPr id="4" name="TextBox 3">
             <a:extLst>
               <a:ext uri="{FF2B5EF4-FFF2-40B4-BE49-F238E27FC236}">
@@ -5559,7 +6745,7 @@
 </p:sld>
 </file>
 
-<file path=ppt/slides/slide11.xml><?xml version="1.0" encoding="utf-8"?>
+<file path=ppt/slides/slide14.xml><?xml version="1.0" encoding="utf-8"?>
 <p:sld xmlns:a="http://schemas.openxmlformats.org/drawingml/2006/main" xmlns:r="http://schemas.openxmlformats.org/officeDocument/2006/relationships" xmlns:p="http://schemas.openxmlformats.org/presentationml/2006/main">
   <p:cSld>
     <p:spTree>
@@ -5605,13 +6791,18 @@
           <a:lstStyle/>
           <a:p>
             <a:r>
-              <a:rPr lang="en-GB" sz="2800" dirty="0">
+              <a:rPr lang="en-GB" sz="2800" dirty="0" smtClean="0">
                 <a:solidFill>
                   <a:srgbClr val="0070C0"/>
                 </a:solidFill>
               </a:rPr>
-              <a:t>Exercise/challenge 4: </a:t>
-            </a:r>
+              <a:t>Exercise: </a:t>
+            </a:r>
+            <a:endParaRPr lang="en-GB" sz="2800" dirty="0">
+              <a:solidFill>
+                <a:srgbClr val="0070C0"/>
+              </a:solidFill>
+            </a:endParaRPr>
           </a:p>
           <a:p>
             <a:pPr algn="ctr"/>
@@ -5649,7 +6840,7 @@
           <p:nvPr/>
         </p:nvPicPr>
         <p:blipFill>
-          <a:blip r:embed="rId2">
+          <a:blip r:embed="rId2" cstate="hqprint">
             <a:extLst>
               <a:ext uri="{28A0092B-C50C-407E-A947-70E740481C1C}">
                 <a14:useLocalDpi xmlns:a14="http://schemas.microsoft.com/office/drawing/2010/main" val="0"/>
@@ -5694,7 +6885,7 @@
 </p:sld>
 </file>
 
-<file path=ppt/slides/slide12.xml><?xml version="1.0" encoding="utf-8"?>
+<file path=ppt/slides/slide15.xml><?xml version="1.0" encoding="utf-8"?>
 <p:sld xmlns:a="http://schemas.openxmlformats.org/drawingml/2006/main" xmlns:r="http://schemas.openxmlformats.org/officeDocument/2006/relationships" xmlns:p="http://schemas.openxmlformats.org/presentationml/2006/main">
   <p:cSld>
     <p:spTree>
@@ -5726,7 +6917,7 @@
           <p:nvPr/>
         </p:nvPicPr>
         <p:blipFill>
-          <a:blip r:embed="rId2">
+          <a:blip r:embed="rId2" cstate="hqprint">
             <a:extLst>
               <a:ext uri="{28A0092B-C50C-407E-A947-70E740481C1C}">
                 <a14:useLocalDpi xmlns:a14="http://schemas.microsoft.com/office/drawing/2010/main" val="0"/>
@@ -6348,6 +7539,419 @@
           <p:cNvPr id="5" name="TextBox 4">
             <a:extLst>
               <a:ext uri="{FF2B5EF4-FFF2-40B4-BE49-F238E27FC236}">
+                <a16:creationId xmlns:a16="http://schemas.microsoft.com/office/drawing/2014/main" id="{3A7A1F5C-9C70-4DE3-BA39-7835B2935EB3}"/>
+              </a:ext>
+            </a:extLst>
+          </p:cNvPr>
+          <p:cNvSpPr txBox="1"/>
+          <p:nvPr/>
+        </p:nvSpPr>
+        <p:spPr>
+          <a:xfrm>
+            <a:off x="993864" y="1057486"/>
+            <a:ext cx="9464530" cy="4401205"/>
+          </a:xfrm>
+          <a:prstGeom prst="rect">
+            <a:avLst/>
+          </a:prstGeom>
+          <a:noFill/>
+        </p:spPr>
+        <p:txBody>
+          <a:bodyPr wrap="square">
+            <a:spAutoFit/>
+          </a:bodyPr>
+          <a:lstStyle/>
+          <a:p>
+            <a:r>
+              <a:rPr lang="pl-PL" sz="2800" dirty="0" smtClean="0">
+                <a:solidFill>
+                  <a:srgbClr val="0070C0"/>
+                </a:solidFill>
+              </a:rPr>
+              <a:t>M</a:t>
+            </a:r>
+            <a:r>
+              <a:rPr lang="en-GB" sz="2800" dirty="0" err="1" smtClean="0">
+                <a:solidFill>
+                  <a:srgbClr val="0070C0"/>
+                </a:solidFill>
+              </a:rPr>
+              <a:t>etadata</a:t>
+            </a:r>
+            <a:r>
+              <a:rPr lang="en-GB" sz="2800" dirty="0" smtClean="0">
+                <a:solidFill>
+                  <a:srgbClr val="0070C0"/>
+                </a:solidFill>
+              </a:rPr>
+              <a:t> </a:t>
+            </a:r>
+            <a:r>
+              <a:rPr lang="en-GB" sz="2800" dirty="0">
+                <a:solidFill>
+                  <a:srgbClr val="0070C0"/>
+                </a:solidFill>
+              </a:rPr>
+              <a:t>is data about the </a:t>
+            </a:r>
+            <a:r>
+              <a:rPr lang="en-GB" sz="2800" dirty="0" smtClean="0">
+                <a:solidFill>
+                  <a:srgbClr val="0070C0"/>
+                </a:solidFill>
+              </a:rPr>
+              <a:t>data</a:t>
+            </a:r>
+            <a:r>
+              <a:rPr lang="pl-PL" sz="2800" dirty="0" smtClean="0">
+                <a:solidFill>
+                  <a:srgbClr val="0070C0"/>
+                </a:solidFill>
+              </a:rPr>
+              <a:t>!</a:t>
+            </a:r>
+            <a:r>
+              <a:rPr lang="en-GB" sz="2800" dirty="0" smtClean="0">
+                <a:solidFill>
+                  <a:srgbClr val="0070C0"/>
+                </a:solidFill>
+              </a:rPr>
+              <a:t> </a:t>
+            </a:r>
+            <a:endParaRPr lang="pl-PL" sz="2800" dirty="0" smtClean="0">
+              <a:solidFill>
+                <a:srgbClr val="0070C0"/>
+              </a:solidFill>
+            </a:endParaRPr>
+          </a:p>
+          <a:p>
+            <a:endParaRPr lang="pl-PL" sz="2800" dirty="0">
+              <a:solidFill>
+                <a:srgbClr val="0070C0"/>
+              </a:solidFill>
+            </a:endParaRPr>
+          </a:p>
+          <a:p>
+            <a:r>
+              <a:rPr lang="pl-PL" sz="2800" dirty="0" smtClean="0">
+                <a:solidFill>
+                  <a:srgbClr val="0070C0"/>
+                </a:solidFill>
+              </a:rPr>
+              <a:t>M</a:t>
+            </a:r>
+            <a:r>
+              <a:rPr lang="en-GB" sz="2800" dirty="0" err="1" smtClean="0">
+                <a:solidFill>
+                  <a:srgbClr val="0070C0"/>
+                </a:solidFill>
+              </a:rPr>
+              <a:t>etadata</a:t>
+            </a:r>
+            <a:r>
+              <a:rPr lang="en-GB" sz="2800" dirty="0" smtClean="0">
+                <a:solidFill>
+                  <a:srgbClr val="0070C0"/>
+                </a:solidFill>
+              </a:rPr>
+              <a:t> </a:t>
+            </a:r>
+            <a:r>
+              <a:rPr lang="en-GB" sz="2800" dirty="0">
+                <a:solidFill>
+                  <a:srgbClr val="0070C0"/>
+                </a:solidFill>
+              </a:rPr>
+              <a:t>is the *description of data*. </a:t>
+            </a:r>
+            <a:endParaRPr lang="pl-PL" sz="2800" dirty="0" smtClean="0">
+              <a:solidFill>
+                <a:srgbClr val="0070C0"/>
+              </a:solidFill>
+            </a:endParaRPr>
+          </a:p>
+          <a:p>
+            <a:endParaRPr lang="pl-PL" sz="2800" dirty="0">
+              <a:solidFill>
+                <a:srgbClr val="0070C0"/>
+              </a:solidFill>
+            </a:endParaRPr>
+          </a:p>
+          <a:p>
+            <a:pPr marL="457200" indent="-457200">
+              <a:buFont typeface="Arial" panose="020B0604020202020204" pitchFamily="34" charset="0"/>
+              <a:buChar char="•"/>
+            </a:pPr>
+            <a:r>
+              <a:rPr lang="pl-PL" sz="2800" dirty="0" smtClean="0">
+                <a:solidFill>
+                  <a:srgbClr val="0070C0"/>
+                </a:solidFill>
+              </a:rPr>
+              <a:t>permits </a:t>
+            </a:r>
+            <a:r>
+              <a:rPr lang="en-GB" sz="2800" dirty="0" smtClean="0">
+                <a:solidFill>
+                  <a:srgbClr val="0070C0"/>
+                </a:solidFill>
+              </a:rPr>
+              <a:t>understanding </a:t>
+            </a:r>
+            <a:r>
+              <a:rPr lang="pl-PL" sz="2800" dirty="0" smtClean="0">
+                <a:solidFill>
+                  <a:srgbClr val="0070C0"/>
+                </a:solidFill>
+              </a:rPr>
+              <a:t>and </a:t>
+            </a:r>
+            <a:r>
+              <a:rPr lang="en-GB" sz="2800" dirty="0">
+                <a:solidFill>
+                  <a:srgbClr val="0070C0"/>
+                </a:solidFill>
+              </a:rPr>
+              <a:t>interpretation </a:t>
+            </a:r>
+            <a:r>
+              <a:rPr lang="pl-PL" sz="2800" dirty="0" smtClean="0">
+                <a:solidFill>
+                  <a:srgbClr val="0070C0"/>
+                </a:solidFill>
+              </a:rPr>
+              <a:t>o</a:t>
+            </a:r>
+            <a:r>
+              <a:rPr lang="en-GB" sz="2800" dirty="0" smtClean="0">
+                <a:solidFill>
+                  <a:srgbClr val="0070C0"/>
+                </a:solidFill>
+              </a:rPr>
+              <a:t>f data</a:t>
+            </a:r>
+            <a:endParaRPr lang="pl-PL" sz="2800" dirty="0" smtClean="0">
+              <a:solidFill>
+                <a:srgbClr val="0070C0"/>
+              </a:solidFill>
+            </a:endParaRPr>
+          </a:p>
+          <a:p>
+            <a:pPr marL="457200" indent="-457200">
+              <a:buFont typeface="Arial" panose="020B0604020202020204" pitchFamily="34" charset="0"/>
+              <a:buChar char="•"/>
+            </a:pPr>
+            <a:r>
+              <a:rPr lang="en-GB" sz="2800" dirty="0" smtClean="0">
+                <a:solidFill>
+                  <a:srgbClr val="0070C0"/>
+                </a:solidFill>
+              </a:rPr>
+              <a:t>as </a:t>
+            </a:r>
+            <a:r>
+              <a:rPr lang="en-GB" sz="2800" dirty="0">
+                <a:solidFill>
+                  <a:srgbClr val="0070C0"/>
+                </a:solidFill>
+              </a:rPr>
+              <a:t>important as your </a:t>
+            </a:r>
+            <a:r>
+              <a:rPr lang="en-GB" sz="2800" dirty="0" smtClean="0">
+                <a:solidFill>
+                  <a:srgbClr val="0070C0"/>
+                </a:solidFill>
+              </a:rPr>
+              <a:t>data </a:t>
+            </a:r>
+            <a:endParaRPr lang="pl-PL" sz="2800" dirty="0" smtClean="0">
+              <a:solidFill>
+                <a:srgbClr val="0070C0"/>
+              </a:solidFill>
+            </a:endParaRPr>
+          </a:p>
+          <a:p>
+            <a:pPr marL="457200" indent="-457200">
+              <a:buFont typeface="Arial" panose="020B0604020202020204" pitchFamily="34" charset="0"/>
+              <a:buChar char="•"/>
+            </a:pPr>
+            <a:endParaRPr lang="pl-PL" sz="2800" dirty="0" smtClean="0">
+              <a:solidFill>
+                <a:srgbClr val="0070C0"/>
+              </a:solidFill>
+            </a:endParaRPr>
+          </a:p>
+          <a:p>
+            <a:pPr marL="457200" indent="-457200">
+              <a:buFont typeface="Arial" panose="020B0604020202020204" pitchFamily="34" charset="0"/>
+              <a:buChar char="•"/>
+            </a:pPr>
+            <a:r>
+              <a:rPr lang="en-GB" sz="2800" dirty="0" smtClean="0">
+                <a:solidFill>
+                  <a:srgbClr val="0070C0"/>
+                </a:solidFill>
+              </a:rPr>
+              <a:t>It </a:t>
+            </a:r>
+            <a:r>
+              <a:rPr lang="en-GB" sz="2800" dirty="0">
+                <a:solidFill>
+                  <a:srgbClr val="0070C0"/>
+                </a:solidFill>
+              </a:rPr>
+              <a:t>should be continuously added to your research </a:t>
+            </a:r>
+            <a:r>
+              <a:rPr lang="en-GB" sz="2800" dirty="0" smtClean="0">
+                <a:solidFill>
+                  <a:srgbClr val="0070C0"/>
+                </a:solidFill>
+              </a:rPr>
+              <a:t>data</a:t>
+            </a:r>
+            <a:endParaRPr lang="pl-PL" sz="2800" dirty="0" smtClean="0">
+              <a:solidFill>
+                <a:srgbClr val="0070C0"/>
+              </a:solidFill>
+            </a:endParaRPr>
+          </a:p>
+          <a:p>
+            <a:pPr marL="457200" indent="-457200">
+              <a:buFont typeface="Arial" panose="020B0604020202020204" pitchFamily="34" charset="0"/>
+              <a:buChar char="•"/>
+            </a:pPr>
+            <a:r>
+              <a:rPr lang="en-GB" sz="2800" dirty="0" smtClean="0">
+                <a:solidFill>
+                  <a:srgbClr val="0070C0"/>
+                </a:solidFill>
+              </a:rPr>
+              <a:t>Metadata </a:t>
+            </a:r>
+            <a:r>
+              <a:rPr lang="en-GB" sz="2800" dirty="0">
+                <a:solidFill>
+                  <a:srgbClr val="0070C0"/>
+                </a:solidFill>
+              </a:rPr>
+              <a:t>can be produced in an automated </a:t>
+            </a:r>
+            <a:r>
+              <a:rPr lang="en-GB" sz="2800" dirty="0" smtClean="0">
+                <a:solidFill>
+                  <a:srgbClr val="0070C0"/>
+                </a:solidFill>
+              </a:rPr>
+              <a:t>way or </a:t>
+            </a:r>
+            <a:r>
+              <a:rPr lang="en-GB" sz="2800" dirty="0">
+                <a:solidFill>
+                  <a:srgbClr val="0070C0"/>
+                </a:solidFill>
+              </a:rPr>
+              <a:t>manually</a:t>
+            </a:r>
+            <a:r>
+              <a:rPr lang="en-GB" sz="2800" dirty="0" smtClean="0">
+                <a:solidFill>
+                  <a:srgbClr val="0070C0"/>
+                </a:solidFill>
+              </a:rPr>
+              <a:t>.</a:t>
+            </a:r>
+            <a:endParaRPr lang="en-GB" sz="2800" dirty="0">
+              <a:solidFill>
+                <a:srgbClr val="0070C0"/>
+              </a:solidFill>
+            </a:endParaRPr>
+          </a:p>
+        </p:txBody>
+      </p:sp>
+      <p:pic>
+        <p:nvPicPr>
+          <p:cNvPr id="6" name="Picture 2" descr="Ed_DaSH">
+            <a:extLst>
+              <a:ext uri="{FF2B5EF4-FFF2-40B4-BE49-F238E27FC236}">
+                <a16:creationId xmlns:a16="http://schemas.microsoft.com/office/drawing/2014/main" id="{6F3CF586-06D2-46C3-A4A3-130E31C4A16F}"/>
+              </a:ext>
+            </a:extLst>
+          </p:cNvPr>
+          <p:cNvPicPr>
+            <a:picLocks noChangeAspect="1" noChangeArrowheads="1"/>
+          </p:cNvPicPr>
+          <p:nvPr/>
+        </p:nvPicPr>
+        <p:blipFill>
+          <a:blip r:embed="rId2" cstate="hqprint">
+            <a:extLst>
+              <a:ext uri="{28A0092B-C50C-407E-A947-70E740481C1C}">
+                <a14:useLocalDpi xmlns:a14="http://schemas.microsoft.com/office/drawing/2010/main" val="0"/>
+              </a:ext>
+            </a:extLst>
+          </a:blip>
+          <a:srcRect/>
+          <a:stretch>
+            <a:fillRect/>
+          </a:stretch>
+        </p:blipFill>
+        <p:spPr bwMode="auto">
+          <a:xfrm>
+            <a:off x="10820670" y="5458691"/>
+            <a:ext cx="1289214" cy="1325418"/>
+          </a:xfrm>
+          <a:prstGeom prst="rect">
+            <a:avLst/>
+          </a:prstGeom>
+          <a:noFill/>
+          <a:extLst>
+            <a:ext uri="{909E8E84-426E-40DD-AFC4-6F175D3DCCD1}">
+              <a14:hiddenFill xmlns:a14="http://schemas.microsoft.com/office/drawing/2010/main">
+                <a:solidFill>
+                  <a:srgbClr val="FFFFFF"/>
+                </a:solidFill>
+              </a14:hiddenFill>
+            </a:ext>
+          </a:extLst>
+        </p:spPr>
+      </p:pic>
+    </p:spTree>
+    <p:extLst>
+      <p:ext uri="{BB962C8B-B14F-4D97-AF65-F5344CB8AC3E}">
+        <p14:creationId xmlns:p14="http://schemas.microsoft.com/office/powerpoint/2010/main" val="867296498"/>
+      </p:ext>
+    </p:extLst>
+  </p:cSld>
+  <p:clrMapOvr>
+    <a:masterClrMapping/>
+  </p:clrMapOvr>
+</p:sld>
+</file>
+
+<file path=ppt/slides/slide3.xml><?xml version="1.0" encoding="utf-8"?>
+<p:sld xmlns:a="http://schemas.openxmlformats.org/drawingml/2006/main" xmlns:r="http://schemas.openxmlformats.org/officeDocument/2006/relationships" xmlns:p="http://schemas.openxmlformats.org/presentationml/2006/main">
+  <p:cSld>
+    <p:spTree>
+      <p:nvGrpSpPr>
+        <p:cNvPr id="1" name=""/>
+        <p:cNvGrpSpPr/>
+        <p:nvPr/>
+      </p:nvGrpSpPr>
+      <p:grpSpPr>
+        <a:xfrm>
+          <a:off x="0" y="0"/>
+          <a:ext cx="0" cy="0"/>
+          <a:chOff x="0" y="0"/>
+          <a:chExt cx="0" cy="0"/>
+        </a:xfrm>
+      </p:grpSpPr>
+      <p:sp>
+        <p:nvSpPr>
+          <p:cNvPr id="5" name="TextBox 4">
+            <a:extLst>
+              <a:ext uri="{FF2B5EF4-FFF2-40B4-BE49-F238E27FC236}">
                 <a16:creationId xmlns:a16="http://schemas.microsoft.com/office/drawing/2014/main" id="{0F1C4547-956D-4711-A29A-436B0F515E7A}"/>
               </a:ext>
             </a:extLst>
@@ -6580,7 +8184,7 @@
 </p:sld>
 </file>
 
-<file path=ppt/slides/slide3.xml><?xml version="1.0" encoding="utf-8"?>
+<file path=ppt/slides/slide4.xml><?xml version="1.0" encoding="utf-8"?>
 <p:sld xmlns:a="http://schemas.openxmlformats.org/drawingml/2006/main" xmlns:r="http://schemas.openxmlformats.org/officeDocument/2006/relationships" xmlns:p="http://schemas.openxmlformats.org/presentationml/2006/main">
   <p:cSld>
     <p:spTree>
@@ -6602,6 +8206,225 @@
           <p:cNvPr id="5" name="TextBox 4">
             <a:extLst>
               <a:ext uri="{FF2B5EF4-FFF2-40B4-BE49-F238E27FC236}">
+                <a16:creationId xmlns:a16="http://schemas.microsoft.com/office/drawing/2014/main" id="{0F1C4547-956D-4711-A29A-436B0F515E7A}"/>
+              </a:ext>
+            </a:extLst>
+          </p:cNvPr>
+          <p:cNvSpPr txBox="1"/>
+          <p:nvPr/>
+        </p:nvSpPr>
+        <p:spPr>
+          <a:xfrm>
+            <a:off x="191199" y="284955"/>
+            <a:ext cx="11385608" cy="369332"/>
+          </a:xfrm>
+          <a:prstGeom prst="rect">
+            <a:avLst/>
+          </a:prstGeom>
+          <a:noFill/>
+        </p:spPr>
+        <p:txBody>
+          <a:bodyPr wrap="square">
+            <a:spAutoFit/>
+          </a:bodyPr>
+          <a:lstStyle/>
+          <a:p>
+            <a:r>
+              <a:rPr lang="pl-PL" dirty="0" smtClean="0">
+                <a:solidFill>
+                  <a:srgbClr val="0070C0"/>
+                </a:solidFill>
+                <a:latin typeface="Ubuntu"/>
+              </a:rPr>
+              <a:t>Life example of metadata types</a:t>
+            </a:r>
+            <a:endParaRPr lang="en-GB" dirty="0">
+              <a:solidFill>
+                <a:srgbClr val="0070C0"/>
+              </a:solidFill>
+              <a:latin typeface="Ubuntu"/>
+            </a:endParaRPr>
+          </a:p>
+        </p:txBody>
+      </p:sp>
+      <p:sp>
+        <p:nvSpPr>
+          <p:cNvPr id="11" name="TextBox 10">
+            <a:extLst>
+              <a:ext uri="{FF2B5EF4-FFF2-40B4-BE49-F238E27FC236}">
+                <a16:creationId xmlns:a16="http://schemas.microsoft.com/office/drawing/2014/main" id="{A21C2D1A-18B4-4E57-AEAE-F6F94593C916}"/>
+              </a:ext>
+            </a:extLst>
+          </p:cNvPr>
+          <p:cNvSpPr txBox="1"/>
+          <p:nvPr/>
+        </p:nvSpPr>
+        <p:spPr>
+          <a:xfrm>
+            <a:off x="7499758" y="6480767"/>
+            <a:ext cx="3061981" cy="276999"/>
+          </a:xfrm>
+          <a:prstGeom prst="rect">
+            <a:avLst/>
+          </a:prstGeom>
+          <a:noFill/>
+        </p:spPr>
+        <p:txBody>
+          <a:bodyPr wrap="square">
+            <a:spAutoFit/>
+          </a:bodyPr>
+          <a:lstStyle/>
+          <a:p>
+            <a:r>
+              <a:rPr lang="en-GB" sz="1200" b="0" i="1" dirty="0">
+                <a:solidFill>
+                  <a:srgbClr val="333333"/>
+                </a:solidFill>
+                <a:effectLst/>
+                <a:latin typeface="Ubuntu"/>
+              </a:rPr>
+              <a:t>Figure credits: </a:t>
+            </a:r>
+            <a:r>
+              <a:rPr lang="en-GB" sz="1200" i="1" dirty="0">
+                <a:solidFill>
+                  <a:srgbClr val="333333"/>
+                </a:solidFill>
+                <a:latin typeface="Ubuntu"/>
+              </a:rPr>
+              <a:t>María Eugenia Goya</a:t>
+            </a:r>
+            <a:endParaRPr lang="en-GB" sz="1200" dirty="0"/>
+          </a:p>
+        </p:txBody>
+      </p:sp>
+      <p:pic>
+        <p:nvPicPr>
+          <p:cNvPr id="3" name="Picture 2" descr="A picture containing invertebrate, worm, green&#10;&#10;Description automatically generated">
+            <a:extLst>
+              <a:ext uri="{FF2B5EF4-FFF2-40B4-BE49-F238E27FC236}">
+                <a16:creationId xmlns:a16="http://schemas.microsoft.com/office/drawing/2014/main" id="{16943301-CDE9-014C-90BF-DC6CF97672D9}"/>
+              </a:ext>
+            </a:extLst>
+          </p:cNvPr>
+          <p:cNvPicPr>
+            <a:picLocks noChangeAspect="1"/>
+          </p:cNvPicPr>
+          <p:nvPr/>
+        </p:nvPicPr>
+        <p:blipFill>
+          <a:blip r:embed="rId3">
+            <a:extLst>
+              <a:ext uri="{28A0092B-C50C-407E-A947-70E740481C1C}">
+                <a14:useLocalDpi xmlns:a14="http://schemas.microsoft.com/office/drawing/2010/main" val="0"/>
+              </a:ext>
+            </a:extLst>
+          </a:blip>
+          <a:stretch>
+            <a:fillRect/>
+          </a:stretch>
+        </p:blipFill>
+        <p:spPr>
+          <a:xfrm>
+            <a:off x="6589777" y="654287"/>
+            <a:ext cx="4881942" cy="3719576"/>
+          </a:xfrm>
+          <a:prstGeom prst="rect">
+            <a:avLst/>
+          </a:prstGeom>
+        </p:spPr>
+      </p:pic>
+      <p:sp>
+        <p:nvSpPr>
+          <p:cNvPr id="2" name="Rectangle 1"/>
+          <p:cNvSpPr/>
+          <p:nvPr/>
+        </p:nvSpPr>
+        <p:spPr>
+          <a:xfrm>
+            <a:off x="366164" y="5574295"/>
+            <a:ext cx="6279924" cy="646331"/>
+          </a:xfrm>
+          <a:prstGeom prst="rect">
+            <a:avLst/>
+          </a:prstGeom>
+        </p:spPr>
+        <p:txBody>
+          <a:bodyPr wrap="none">
+            <a:spAutoFit/>
+          </a:bodyPr>
+          <a:lstStyle/>
+          <a:p>
+            <a:r>
+              <a:rPr lang="en-GB" dirty="0">
+                <a:hlinkClick r:id="rId4"/>
+              </a:rPr>
+              <a:t>https://publicomero.bio.ed.ac.uk/webclient/?</a:t>
+            </a:r>
+            <a:r>
+              <a:rPr lang="en-GB" dirty="0" smtClean="0">
+                <a:hlinkClick r:id="rId4"/>
+              </a:rPr>
+              <a:t>show=project-58</a:t>
+            </a:r>
+            <a:endParaRPr lang="pl-PL" dirty="0" smtClean="0"/>
+          </a:p>
+          <a:p>
+            <a:r>
+              <a:rPr lang="pl-PL" dirty="0">
+                <a:hlinkClick r:id="rId5"/>
+              </a:rPr>
+              <a:t>https://publicomero.bio.ed.ac.uk/webclient/?</a:t>
+            </a:r>
+            <a:r>
+              <a:rPr lang="pl-PL" dirty="0" smtClean="0">
+                <a:hlinkClick r:id="rId5"/>
+              </a:rPr>
+              <a:t>show=dataset-231</a:t>
+            </a:r>
+            <a:r>
+              <a:rPr lang="pl-PL" dirty="0" smtClean="0"/>
+              <a:t>  </a:t>
+            </a:r>
+            <a:endParaRPr lang="en-GB" dirty="0"/>
+          </a:p>
+        </p:txBody>
+      </p:sp>
+    </p:spTree>
+    <p:extLst>
+      <p:ext uri="{BB962C8B-B14F-4D97-AF65-F5344CB8AC3E}">
+        <p14:creationId xmlns:p14="http://schemas.microsoft.com/office/powerpoint/2010/main" val="361507910"/>
+      </p:ext>
+    </p:extLst>
+  </p:cSld>
+  <p:clrMapOvr>
+    <a:masterClrMapping/>
+  </p:clrMapOvr>
+</p:sld>
+</file>
+
+<file path=ppt/slides/slide5.xml><?xml version="1.0" encoding="utf-8"?>
+<p:sld xmlns:a="http://schemas.openxmlformats.org/drawingml/2006/main" xmlns:r="http://schemas.openxmlformats.org/officeDocument/2006/relationships" xmlns:p="http://schemas.openxmlformats.org/presentationml/2006/main">
+  <p:cSld>
+    <p:spTree>
+      <p:nvGrpSpPr>
+        <p:cNvPr id="1" name=""/>
+        <p:cNvGrpSpPr/>
+        <p:nvPr/>
+      </p:nvGrpSpPr>
+      <p:grpSpPr>
+        <a:xfrm>
+          <a:off x="0" y="0"/>
+          <a:ext cx="0" cy="0"/>
+          <a:chOff x="0" y="0"/>
+          <a:chExt cx="0" cy="0"/>
+        </a:xfrm>
+      </p:grpSpPr>
+      <p:sp>
+        <p:nvSpPr>
+          <p:cNvPr id="5" name="TextBox 4">
+            <a:extLst>
+              <a:ext uri="{FF2B5EF4-FFF2-40B4-BE49-F238E27FC236}">
                 <a16:creationId xmlns:a16="http://schemas.microsoft.com/office/drawing/2014/main" id="{3A7A1F5C-9C70-4DE3-BA39-7835B2935EB3}"/>
               </a:ext>
             </a:extLst>
@@ -6748,7 +8571,7 @@
           <p:nvPr/>
         </p:nvPicPr>
         <p:blipFill>
-          <a:blip r:embed="rId2">
+          <a:blip r:embed="rId2" cstate="hqprint">
             <a:extLst>
               <a:ext uri="{28A0092B-C50C-407E-A947-70E740481C1C}">
                 <a14:useLocalDpi xmlns:a14="http://schemas.microsoft.com/office/drawing/2010/main" val="0"/>
@@ -6793,7 +8616,7 @@
 </p:sld>
 </file>
 
-<file path=ppt/slides/slide4.xml><?xml version="1.0" encoding="utf-8"?>
+<file path=ppt/slides/slide6.xml><?xml version="1.0" encoding="utf-8"?>
 <p:sld xmlns:a="http://schemas.openxmlformats.org/drawingml/2006/main" xmlns:r="http://schemas.openxmlformats.org/officeDocument/2006/relationships" xmlns:p="http://schemas.openxmlformats.org/presentationml/2006/main">
   <p:cSld>
     <p:spTree>
@@ -6875,7 +8698,7 @@
           <p:nvPr/>
         </p:nvPicPr>
         <p:blipFill>
-          <a:blip r:embed="rId3">
+          <a:blip r:embed="rId3" cstate="hqprint">
             <a:extLst>
               <a:ext uri="{28A0092B-C50C-407E-A947-70E740481C1C}">
                 <a14:useLocalDpi xmlns:a14="http://schemas.microsoft.com/office/drawing/2010/main" val="0"/>
@@ -7006,7 +8829,7 @@
 </p:sld>
 </file>
 
-<file path=ppt/slides/slide5.xml><?xml version="1.0" encoding="utf-8"?>
+<file path=ppt/slides/slide7.xml><?xml version="1.0" encoding="utf-8"?>
 <p:sld xmlns:a="http://schemas.openxmlformats.org/drawingml/2006/main" xmlns:r="http://schemas.openxmlformats.org/officeDocument/2006/relationships" xmlns:p="http://schemas.openxmlformats.org/presentationml/2006/main">
   <p:cSld>
     <p:spTree>
@@ -7088,7 +8911,7 @@
           <p:nvPr/>
         </p:nvPicPr>
         <p:blipFill>
-          <a:blip r:embed="rId3">
+          <a:blip r:embed="rId3" cstate="hqprint">
             <a:extLst>
               <a:ext uri="{28A0092B-C50C-407E-A947-70E740481C1C}">
                 <a14:useLocalDpi xmlns:a14="http://schemas.microsoft.com/office/drawing/2010/main" val="0"/>
@@ -7291,511 +9114,6 @@
     <p:extLst>
       <p:ext uri="{BB962C8B-B14F-4D97-AF65-F5344CB8AC3E}">
         <p14:creationId xmlns:p14="http://schemas.microsoft.com/office/powerpoint/2010/main" val="983723164"/>
-      </p:ext>
-    </p:extLst>
-  </p:cSld>
-  <p:clrMapOvr>
-    <a:masterClrMapping/>
-  </p:clrMapOvr>
-</p:sld>
-</file>
-
-<file path=ppt/slides/slide6.xml><?xml version="1.0" encoding="utf-8"?>
-<p:sld xmlns:a="http://schemas.openxmlformats.org/drawingml/2006/main" xmlns:r="http://schemas.openxmlformats.org/officeDocument/2006/relationships" xmlns:p="http://schemas.openxmlformats.org/presentationml/2006/main">
-  <p:cSld>
-    <p:spTree>
-      <p:nvGrpSpPr>
-        <p:cNvPr id="1" name=""/>
-        <p:cNvGrpSpPr/>
-        <p:nvPr/>
-      </p:nvGrpSpPr>
-      <p:grpSpPr>
-        <a:xfrm>
-          <a:off x="0" y="0"/>
-          <a:ext cx="0" cy="0"/>
-          <a:chOff x="0" y="0"/>
-          <a:chExt cx="0" cy="0"/>
-        </a:xfrm>
-      </p:grpSpPr>
-      <p:sp>
-        <p:nvSpPr>
-          <p:cNvPr id="6" name="TextBox 5">
-            <a:extLst>
-              <a:ext uri="{FF2B5EF4-FFF2-40B4-BE49-F238E27FC236}">
-                <a16:creationId xmlns:a16="http://schemas.microsoft.com/office/drawing/2014/main" id="{B082BCFF-DF99-4045-952C-843651C9A9DC}"/>
-              </a:ext>
-            </a:extLst>
-          </p:cNvPr>
-          <p:cNvSpPr txBox="1"/>
-          <p:nvPr/>
-        </p:nvSpPr>
-        <p:spPr>
-          <a:xfrm>
-            <a:off x="403196" y="133212"/>
-            <a:ext cx="11385608" cy="769441"/>
-          </a:xfrm>
-          <a:prstGeom prst="rect">
-            <a:avLst/>
-          </a:prstGeom>
-          <a:noFill/>
-        </p:spPr>
-        <p:txBody>
-          <a:bodyPr wrap="square">
-            <a:spAutoFit/>
-          </a:bodyPr>
-          <a:lstStyle/>
-          <a:p>
-            <a:r>
-              <a:rPr lang="en-GB" sz="2200" b="0" i="0" dirty="0">
-                <a:solidFill>
-                  <a:srgbClr val="0070C0"/>
-                </a:solidFill>
-                <a:effectLst/>
-                <a:latin typeface="Ubuntu"/>
-              </a:rPr>
-              <a:t>Metadata should be </a:t>
-            </a:r>
-            <a:r>
-              <a:rPr lang="en-GB" sz="2200" dirty="0">
-                <a:solidFill>
-                  <a:srgbClr val="0070C0"/>
-                </a:solidFill>
-                <a:latin typeface="Ubuntu"/>
-              </a:rPr>
-              <a:t>interoperable, i.e. should use formal, accessible, shared, and broadly applicable terms/language.</a:t>
-            </a:r>
-            <a:endParaRPr lang="en-GB" sz="2200" b="0" i="0" dirty="0">
-              <a:solidFill>
-                <a:srgbClr val="0070C0"/>
-              </a:solidFill>
-              <a:effectLst/>
-              <a:latin typeface="Ubuntu"/>
-            </a:endParaRPr>
-          </a:p>
-        </p:txBody>
-      </p:sp>
-      <p:pic>
-        <p:nvPicPr>
-          <p:cNvPr id="3" name="Picture 2" descr="Table&#10;&#10;Description automatically generated">
-            <a:extLst>
-              <a:ext uri="{FF2B5EF4-FFF2-40B4-BE49-F238E27FC236}">
-                <a16:creationId xmlns:a16="http://schemas.microsoft.com/office/drawing/2014/main" id="{127D420B-FFAE-0F45-A57A-2D425EC88F1B}"/>
-              </a:ext>
-            </a:extLst>
-          </p:cNvPr>
-          <p:cNvPicPr>
-            <a:picLocks noChangeAspect="1"/>
-          </p:cNvPicPr>
-          <p:nvPr/>
-        </p:nvPicPr>
-        <p:blipFill>
-          <a:blip r:embed="rId2">
-            <a:extLst>
-              <a:ext uri="{28A0092B-C50C-407E-A947-70E740481C1C}">
-                <a14:useLocalDpi xmlns:a14="http://schemas.microsoft.com/office/drawing/2010/main" val="0"/>
-              </a:ext>
-            </a:extLst>
-          </a:blip>
-          <a:stretch>
-            <a:fillRect/>
-          </a:stretch>
-        </p:blipFill>
-        <p:spPr>
-          <a:xfrm>
-            <a:off x="3630348" y="561476"/>
-            <a:ext cx="8033842" cy="6033579"/>
-          </a:xfrm>
-          <a:prstGeom prst="rect">
-            <a:avLst/>
-          </a:prstGeom>
-        </p:spPr>
-      </p:pic>
-    </p:spTree>
-    <p:extLst>
-      <p:ext uri="{BB962C8B-B14F-4D97-AF65-F5344CB8AC3E}">
-        <p14:creationId xmlns:p14="http://schemas.microsoft.com/office/powerpoint/2010/main" val="3747721469"/>
-      </p:ext>
-    </p:extLst>
-  </p:cSld>
-  <p:clrMapOvr>
-    <a:masterClrMapping/>
-  </p:clrMapOvr>
-</p:sld>
-</file>
-
-<file path=ppt/slides/slide7.xml><?xml version="1.0" encoding="utf-8"?>
-<p:sld xmlns:a="http://schemas.openxmlformats.org/drawingml/2006/main" xmlns:r="http://schemas.openxmlformats.org/officeDocument/2006/relationships" xmlns:p="http://schemas.openxmlformats.org/presentationml/2006/main">
-  <p:cSld>
-    <p:spTree>
-      <p:nvGrpSpPr>
-        <p:cNvPr id="1" name=""/>
-        <p:cNvGrpSpPr/>
-        <p:nvPr/>
-      </p:nvGrpSpPr>
-      <p:grpSpPr>
-        <a:xfrm>
-          <a:off x="0" y="0"/>
-          <a:ext cx="0" cy="0"/>
-          <a:chOff x="0" y="0"/>
-          <a:chExt cx="0" cy="0"/>
-        </a:xfrm>
-      </p:grpSpPr>
-      <p:pic>
-        <p:nvPicPr>
-          <p:cNvPr id="4" name="Picture 2" descr="Ed_DaSH">
-            <a:extLst>
-              <a:ext uri="{FF2B5EF4-FFF2-40B4-BE49-F238E27FC236}">
-                <a16:creationId xmlns:a16="http://schemas.microsoft.com/office/drawing/2014/main" id="{A783256F-E39E-4712-96B0-240BD611CFEB}"/>
-              </a:ext>
-            </a:extLst>
-          </p:cNvPr>
-          <p:cNvPicPr>
-            <a:picLocks noChangeAspect="1" noChangeArrowheads="1"/>
-          </p:cNvPicPr>
-          <p:nvPr/>
-        </p:nvPicPr>
-        <p:blipFill>
-          <a:blip r:embed="rId3">
-            <a:extLst>
-              <a:ext uri="{28A0092B-C50C-407E-A947-70E740481C1C}">
-                <a14:useLocalDpi xmlns:a14="http://schemas.microsoft.com/office/drawing/2010/main" val="0"/>
-              </a:ext>
-            </a:extLst>
-          </a:blip>
-          <a:srcRect/>
-          <a:stretch>
-            <a:fillRect/>
-          </a:stretch>
-        </p:blipFill>
-        <p:spPr bwMode="auto">
-          <a:xfrm>
-            <a:off x="10820670" y="5458691"/>
-            <a:ext cx="1289214" cy="1325418"/>
-          </a:xfrm>
-          <a:prstGeom prst="rect">
-            <a:avLst/>
-          </a:prstGeom>
-          <a:noFill/>
-          <a:extLst>
-            <a:ext uri="{909E8E84-426E-40DD-AFC4-6F175D3DCCD1}">
-              <a14:hiddenFill xmlns:a14="http://schemas.microsoft.com/office/drawing/2010/main">
-                <a:solidFill>
-                  <a:srgbClr val="FFFFFF"/>
-                </a:solidFill>
-              </a14:hiddenFill>
-            </a:ext>
-          </a:extLst>
-        </p:spPr>
-      </p:pic>
-      <p:pic>
-        <p:nvPicPr>
-          <p:cNvPr id="3" name="Picture 2" descr="Logo&#10;&#10;Description automatically generated">
-            <a:extLst>
-              <a:ext uri="{FF2B5EF4-FFF2-40B4-BE49-F238E27FC236}">
-                <a16:creationId xmlns:a16="http://schemas.microsoft.com/office/drawing/2014/main" id="{0582AB40-2AC4-154A-A1B3-0C2DBD1A86CD}"/>
-              </a:ext>
-            </a:extLst>
-          </p:cNvPr>
-          <p:cNvPicPr>
-            <a:picLocks noChangeAspect="1"/>
-          </p:cNvPicPr>
-          <p:nvPr/>
-        </p:nvPicPr>
-        <p:blipFill>
-          <a:blip r:embed="rId4">
-            <a:extLst>
-              <a:ext uri="{28A0092B-C50C-407E-A947-70E740481C1C}">
-                <a14:useLocalDpi xmlns:a14="http://schemas.microsoft.com/office/drawing/2010/main" val="0"/>
-              </a:ext>
-            </a:extLst>
-          </a:blip>
-          <a:stretch>
-            <a:fillRect/>
-          </a:stretch>
-        </p:blipFill>
-        <p:spPr>
-          <a:xfrm>
-            <a:off x="3216148" y="0"/>
-            <a:ext cx="5759704" cy="3029604"/>
-          </a:xfrm>
-          <a:prstGeom prst="rect">
-            <a:avLst/>
-          </a:prstGeom>
-        </p:spPr>
-      </p:pic>
-      <p:sp>
-        <p:nvSpPr>
-          <p:cNvPr id="7" name="TextBox 6">
-            <a:extLst>
-              <a:ext uri="{FF2B5EF4-FFF2-40B4-BE49-F238E27FC236}">
-                <a16:creationId xmlns:a16="http://schemas.microsoft.com/office/drawing/2014/main" id="{F413087A-5C6C-5340-8CDA-C1BD75CF7F93}"/>
-              </a:ext>
-            </a:extLst>
-          </p:cNvPr>
-          <p:cNvSpPr txBox="1"/>
-          <p:nvPr/>
-        </p:nvSpPr>
-        <p:spPr>
-          <a:xfrm>
-            <a:off x="2761488" y="2814160"/>
-            <a:ext cx="6669024" cy="430887"/>
-          </a:xfrm>
-          <a:prstGeom prst="rect">
-            <a:avLst/>
-          </a:prstGeom>
-          <a:noFill/>
-        </p:spPr>
-        <p:txBody>
-          <a:bodyPr wrap="square">
-            <a:spAutoFit/>
-          </a:bodyPr>
-          <a:lstStyle/>
-          <a:p>
-            <a:pPr algn="ctr"/>
-            <a:r>
-              <a:rPr lang="en-GB" sz="2200" b="0" i="0" dirty="0">
-                <a:solidFill>
-                  <a:srgbClr val="0070C0"/>
-                </a:solidFill>
-                <a:effectLst/>
-                <a:latin typeface="Ubuntu"/>
-              </a:rPr>
-              <a:t>Free, unique, and persistent identifier which you control</a:t>
-            </a:r>
-          </a:p>
-        </p:txBody>
-      </p:sp>
-      <p:sp>
-        <p:nvSpPr>
-          <p:cNvPr id="10" name="TextBox 9">
-            <a:extLst>
-              <a:ext uri="{FF2B5EF4-FFF2-40B4-BE49-F238E27FC236}">
-                <a16:creationId xmlns:a16="http://schemas.microsoft.com/office/drawing/2014/main" id="{280516E9-127E-E84A-BC30-0B68C3087BD7}"/>
-              </a:ext>
-            </a:extLst>
-          </p:cNvPr>
-          <p:cNvSpPr txBox="1"/>
-          <p:nvPr/>
-        </p:nvSpPr>
-        <p:spPr>
-          <a:xfrm>
-            <a:off x="1005981" y="3612954"/>
-            <a:ext cx="6096000" cy="2246769"/>
-          </a:xfrm>
-          <a:prstGeom prst="rect">
-            <a:avLst/>
-          </a:prstGeom>
-          <a:noFill/>
-        </p:spPr>
-        <p:txBody>
-          <a:bodyPr wrap="square">
-            <a:spAutoFit/>
-          </a:bodyPr>
-          <a:lstStyle/>
-          <a:p>
-            <a:r>
-              <a:rPr lang="en-GB" sz="2000" dirty="0">
-                <a:solidFill>
-                  <a:srgbClr val="0070C0"/>
-                </a:solidFill>
-                <a:latin typeface="Ubuntu"/>
-              </a:rPr>
-              <a:t>Similarly, other registries can be used to identify many biological concepts and entities:</a:t>
-            </a:r>
-          </a:p>
-          <a:p>
-            <a:pPr marL="342900" indent="-342900">
-              <a:buFont typeface="Arial" panose="020B0604020202020204" pitchFamily="34" charset="0"/>
-              <a:buChar char="•"/>
-            </a:pPr>
-            <a:r>
-              <a:rPr lang="en-GB" sz="2000" dirty="0">
-                <a:solidFill>
-                  <a:srgbClr val="0070C0"/>
-                </a:solidFill>
-                <a:latin typeface="Ubuntu"/>
-              </a:rPr>
-              <a:t>species e.g. NCBI taxonomy</a:t>
-            </a:r>
-          </a:p>
-          <a:p>
-            <a:pPr marL="342900" indent="-342900">
-              <a:buFont typeface="Arial" panose="020B0604020202020204" pitchFamily="34" charset="0"/>
-              <a:buChar char="•"/>
-            </a:pPr>
-            <a:r>
-              <a:rPr lang="en-GB" sz="2000" dirty="0">
-                <a:solidFill>
-                  <a:srgbClr val="0070C0"/>
-                </a:solidFill>
-                <a:latin typeface="Ubuntu"/>
-              </a:rPr>
-              <a:t>chemicals e.g. </a:t>
-            </a:r>
-            <a:r>
-              <a:rPr lang="en-GB" sz="2000" dirty="0" err="1">
-                <a:solidFill>
-                  <a:srgbClr val="0070C0"/>
-                </a:solidFill>
-                <a:latin typeface="Ubuntu"/>
-              </a:rPr>
-              <a:t>ChEBI</a:t>
-            </a:r>
-            <a:endParaRPr lang="en-GB" sz="2000" dirty="0">
-              <a:solidFill>
-                <a:srgbClr val="0070C0"/>
-              </a:solidFill>
-              <a:latin typeface="Ubuntu"/>
-            </a:endParaRPr>
-          </a:p>
-          <a:p>
-            <a:pPr marL="342900" indent="-342900">
-              <a:buFont typeface="Arial" panose="020B0604020202020204" pitchFamily="34" charset="0"/>
-              <a:buChar char="•"/>
-            </a:pPr>
-            <a:r>
-              <a:rPr lang="en-GB" sz="2000" dirty="0">
-                <a:solidFill>
-                  <a:srgbClr val="0070C0"/>
-                </a:solidFill>
-                <a:latin typeface="Ubuntu"/>
-              </a:rPr>
-              <a:t>proteins e.g. </a:t>
-            </a:r>
-            <a:r>
-              <a:rPr lang="en-GB" sz="2000" dirty="0" err="1">
-                <a:solidFill>
-                  <a:srgbClr val="0070C0"/>
-                </a:solidFill>
-                <a:latin typeface="Ubuntu"/>
-              </a:rPr>
-              <a:t>UniProt</a:t>
-            </a:r>
-            <a:endParaRPr lang="en-GB" sz="2000" dirty="0">
-              <a:solidFill>
-                <a:srgbClr val="0070C0"/>
-              </a:solidFill>
-              <a:latin typeface="Ubuntu"/>
-            </a:endParaRPr>
-          </a:p>
-          <a:p>
-            <a:pPr marL="342900" indent="-342900">
-              <a:buFont typeface="Arial" panose="020B0604020202020204" pitchFamily="34" charset="0"/>
-              <a:buChar char="•"/>
-            </a:pPr>
-            <a:r>
-              <a:rPr lang="en-GB" sz="2000" dirty="0">
-                <a:solidFill>
-                  <a:srgbClr val="0070C0"/>
-                </a:solidFill>
-                <a:latin typeface="Ubuntu"/>
-              </a:rPr>
-              <a:t>genes e.g. GenBank</a:t>
-            </a:r>
-          </a:p>
-          <a:p>
-            <a:pPr marL="342900" indent="-342900">
-              <a:buFont typeface="Arial" panose="020B0604020202020204" pitchFamily="34" charset="0"/>
-              <a:buChar char="•"/>
-            </a:pPr>
-            <a:r>
-              <a:rPr lang="en-GB" sz="2000" dirty="0">
-                <a:solidFill>
-                  <a:srgbClr val="0070C0"/>
-                </a:solidFill>
-                <a:latin typeface="Ubuntu"/>
-              </a:rPr>
-              <a:t>metabolic reactions, enzymes </a:t>
-            </a:r>
-            <a:r>
-              <a:rPr lang="en-GB" sz="2000" dirty="0" err="1">
-                <a:solidFill>
-                  <a:srgbClr val="0070C0"/>
-                </a:solidFill>
-                <a:latin typeface="Ubuntu"/>
-              </a:rPr>
-              <a:t>e.g</a:t>
-            </a:r>
-            <a:r>
-              <a:rPr lang="en-GB" sz="2000" dirty="0">
-                <a:solidFill>
-                  <a:srgbClr val="0070C0"/>
-                </a:solidFill>
-                <a:latin typeface="Ubuntu"/>
-              </a:rPr>
-              <a:t> KEGG</a:t>
-            </a:r>
-            <a:endParaRPr lang="en-GB" sz="2000" b="0" i="0" dirty="0">
-              <a:solidFill>
-                <a:srgbClr val="0070C0"/>
-              </a:solidFill>
-              <a:effectLst/>
-              <a:latin typeface="Ubuntu"/>
-            </a:endParaRPr>
-          </a:p>
-        </p:txBody>
-      </p:sp>
-      <p:sp>
-        <p:nvSpPr>
-          <p:cNvPr id="6" name="Rectangle 5">
-            <a:extLst>
-              <a:ext uri="{FF2B5EF4-FFF2-40B4-BE49-F238E27FC236}">
-                <a16:creationId xmlns:a16="http://schemas.microsoft.com/office/drawing/2014/main" id="{0BC63AE1-BA01-DB49-9E34-8940234F6FD5}"/>
-              </a:ext>
-            </a:extLst>
-          </p:cNvPr>
-          <p:cNvSpPr/>
-          <p:nvPr/>
-        </p:nvSpPr>
-        <p:spPr>
-          <a:xfrm>
-            <a:off x="7618842" y="4386747"/>
-            <a:ext cx="2714019" cy="923330"/>
-          </a:xfrm>
-          <a:prstGeom prst="rect">
-            <a:avLst/>
-          </a:prstGeom>
-        </p:spPr>
-        <p:txBody>
-          <a:bodyPr wrap="square">
-            <a:spAutoFit/>
-          </a:bodyPr>
-          <a:lstStyle/>
-          <a:p>
-            <a:r>
-              <a:rPr lang="en-GB" dirty="0">
-                <a:solidFill>
-                  <a:srgbClr val="0070C0"/>
-                </a:solidFill>
-                <a:latin typeface="Ubuntu"/>
-              </a:rPr>
-              <a:t>NCBI or </a:t>
-            </a:r>
-            <a:r>
-              <a:rPr lang="en-GB" dirty="0" err="1">
-                <a:solidFill>
-                  <a:srgbClr val="0070C0"/>
-                </a:solidFill>
-                <a:latin typeface="Ubuntu"/>
-              </a:rPr>
-              <a:t>BioPortal</a:t>
-            </a:r>
-            <a:r>
-              <a:rPr lang="en-GB" dirty="0">
-                <a:solidFill>
-                  <a:srgbClr val="0070C0"/>
-                </a:solidFill>
-                <a:latin typeface="Ubuntu"/>
-              </a:rPr>
-              <a:t> are good places to start searching for a registry or a term.</a:t>
-            </a:r>
-          </a:p>
-        </p:txBody>
-      </p:sp>
-    </p:spTree>
-    <p:extLst>
-      <p:ext uri="{BB962C8B-B14F-4D97-AF65-F5344CB8AC3E}">
-        <p14:creationId xmlns:p14="http://schemas.microsoft.com/office/powerpoint/2010/main" val="667789924"/>
       </p:ext>
     </p:extLst>
   </p:cSld>
@@ -7824,10 +9142,10 @@
       </p:grpSpPr>
       <p:sp>
         <p:nvSpPr>
-          <p:cNvPr id="5" name="TextBox 4">
-            <a:extLst>
-              <a:ext uri="{FF2B5EF4-FFF2-40B4-BE49-F238E27FC236}">
-                <a16:creationId xmlns:a16="http://schemas.microsoft.com/office/drawing/2014/main" id="{3A7A1F5C-9C70-4DE3-BA39-7835B2935EB3}"/>
+          <p:cNvPr id="3" name="TextBox 2">
+            <a:extLst>
+              <a:ext uri="{FF2B5EF4-FFF2-40B4-BE49-F238E27FC236}">
+                <a16:creationId xmlns:a16="http://schemas.microsoft.com/office/drawing/2014/main" id="{CC9F008A-0A52-314A-9B20-E8308A46FAC5}"/>
               </a:ext>
             </a:extLst>
           </p:cNvPr>
@@ -7836,8 +9154,8 @@
         </p:nvSpPr>
         <p:spPr>
           <a:xfrm>
-            <a:off x="1363735" y="1853859"/>
-            <a:ext cx="9464530" cy="1384995"/>
+            <a:off x="1135005" y="185352"/>
+            <a:ext cx="9464530" cy="523220"/>
           </a:xfrm>
           <a:prstGeom prst="rect">
             <a:avLst/>
@@ -7856,27 +9174,13 @@
                   <a:srgbClr val="0070C0"/>
                 </a:solidFill>
               </a:rPr>
-              <a:t>Exercise/challenge 3: </a:t>
-            </a:r>
-          </a:p>
-          <a:p>
-            <a:pPr algn="ctr"/>
+              <a:t>Where does data end and metadata start?</a:t>
+            </a:r>
             <a:endParaRPr lang="en-GB" sz="2800" dirty="0">
               <a:solidFill>
                 <a:srgbClr val="0070C0"/>
               </a:solidFill>
             </a:endParaRPr>
-          </a:p>
-          <a:p>
-            <a:pPr algn="ctr"/>
-            <a:r>
-              <a:rPr lang="en-GB" sz="2800" dirty="0">
-                <a:solidFill>
-                  <a:srgbClr val="0070C0"/>
-                </a:solidFill>
-              </a:rPr>
-              <a:t>Public ID in action</a:t>
-            </a:r>
           </a:p>
         </p:txBody>
       </p:sp>
@@ -7895,7 +9199,7 @@
           <p:nvPr/>
         </p:nvPicPr>
         <p:blipFill>
-          <a:blip r:embed="rId3">
+          <a:blip r:embed="rId3" cstate="hqprint">
             <a:extLst>
               <a:ext uri="{28A0092B-C50C-407E-A947-70E740481C1C}">
                 <a14:useLocalDpi xmlns:a14="http://schemas.microsoft.com/office/drawing/2010/main" val="0"/>
@@ -7927,10 +9231,170 @@
           </a:extLst>
         </p:spPr>
       </p:pic>
+      <p:sp>
+        <p:nvSpPr>
+          <p:cNvPr id="2" name="Rectangle 1"/>
+          <p:cNvSpPr/>
+          <p:nvPr/>
+        </p:nvSpPr>
+        <p:spPr>
+          <a:xfrm>
+            <a:off x="589085" y="1151792"/>
+            <a:ext cx="10304584" cy="2585323"/>
+          </a:xfrm>
+          <a:prstGeom prst="rect">
+            <a:avLst/>
+          </a:prstGeom>
+        </p:spPr>
+        <p:txBody>
+          <a:bodyPr wrap="square">
+            <a:spAutoFit/>
+          </a:bodyPr>
+          <a:lstStyle/>
+          <a:p>
+            <a:r>
+              <a:rPr lang="en-GB" dirty="0">
+                <a:solidFill>
+                  <a:srgbClr val="0070C0"/>
+                </a:solidFill>
+              </a:rPr>
+              <a:t>What is "data" and what is "metadata" can be a matter </a:t>
+            </a:r>
+            <a:r>
+              <a:rPr lang="en-GB" dirty="0" smtClean="0">
+                <a:solidFill>
+                  <a:srgbClr val="0070C0"/>
+                </a:solidFill>
+              </a:rPr>
+              <a:t>of </a:t>
+            </a:r>
+            <a:r>
+              <a:rPr lang="en-GB" dirty="0">
+                <a:solidFill>
+                  <a:srgbClr val="0070C0"/>
+                </a:solidFill>
+              </a:rPr>
+              <a:t>perspective: </a:t>
+            </a:r>
+            <a:endParaRPr lang="pl-PL" dirty="0" smtClean="0">
+              <a:solidFill>
+                <a:srgbClr val="0070C0"/>
+              </a:solidFill>
+            </a:endParaRPr>
+          </a:p>
+          <a:p>
+            <a:endParaRPr lang="pl-PL" dirty="0">
+              <a:solidFill>
+                <a:srgbClr val="0070C0"/>
+              </a:solidFill>
+            </a:endParaRPr>
+          </a:p>
+          <a:p>
+            <a:r>
+              <a:rPr lang="en-GB" b="1" dirty="0" smtClean="0">
+                <a:solidFill>
+                  <a:srgbClr val="0070C0"/>
+                </a:solidFill>
+              </a:rPr>
+              <a:t>Some </a:t>
+            </a:r>
+            <a:r>
+              <a:rPr lang="en-GB" b="1" dirty="0">
+                <a:solidFill>
+                  <a:srgbClr val="0070C0"/>
+                </a:solidFill>
+              </a:rPr>
+              <a:t>researchers' metadata can be other researchers</a:t>
+            </a:r>
+            <a:r>
+              <a:rPr lang="en-GB" b="1" dirty="0" smtClean="0">
+                <a:solidFill>
+                  <a:srgbClr val="0070C0"/>
+                </a:solidFill>
+              </a:rPr>
+              <a:t>' </a:t>
+            </a:r>
+            <a:r>
+              <a:rPr lang="en-GB" b="1" dirty="0">
+                <a:solidFill>
+                  <a:srgbClr val="0070C0"/>
+                </a:solidFill>
+              </a:rPr>
+              <a:t>data.</a:t>
+            </a:r>
+            <a:endParaRPr lang="pl-PL" b="1" dirty="0">
+              <a:solidFill>
+                <a:srgbClr val="0070C0"/>
+              </a:solidFill>
+            </a:endParaRPr>
+          </a:p>
+          <a:p>
+            <a:pPr marL="285750" indent="-285750">
+              <a:buFont typeface="Arial" panose="020B0604020202020204" pitchFamily="34" charset="0"/>
+              <a:buChar char="•"/>
+            </a:pPr>
+            <a:endParaRPr lang="pl-PL" dirty="0" smtClean="0">
+              <a:solidFill>
+                <a:srgbClr val="0070C0"/>
+              </a:solidFill>
+            </a:endParaRPr>
+          </a:p>
+          <a:p>
+            <a:pPr marL="285750" indent="-285750">
+              <a:buFont typeface="Arial" panose="020B0604020202020204" pitchFamily="34" charset="0"/>
+              <a:buChar char="•"/>
+            </a:pPr>
+            <a:endParaRPr lang="pl-PL" dirty="0" smtClean="0">
+              <a:solidFill>
+                <a:srgbClr val="0070C0"/>
+              </a:solidFill>
+            </a:endParaRPr>
+          </a:p>
+          <a:p>
+            <a:pPr marL="285750" indent="-285750">
+              <a:buFont typeface="Arial" panose="020B0604020202020204" pitchFamily="34" charset="0"/>
+              <a:buChar char="•"/>
+            </a:pPr>
+            <a:endParaRPr lang="pl-PL" dirty="0">
+              <a:solidFill>
+                <a:srgbClr val="0070C0"/>
+              </a:solidFill>
+            </a:endParaRPr>
+          </a:p>
+          <a:p>
+            <a:pPr marL="285750" indent="-285750">
+              <a:buFont typeface="Arial" panose="020B0604020202020204" pitchFamily="34" charset="0"/>
+              <a:buChar char="•"/>
+            </a:pPr>
+            <a:endParaRPr lang="pl-PL" dirty="0">
+              <a:solidFill>
+                <a:srgbClr val="0070C0"/>
+              </a:solidFill>
+            </a:endParaRPr>
+          </a:p>
+          <a:p>
+            <a:r>
+              <a:rPr lang="pl-PL" dirty="0" smtClean="0">
+                <a:solidFill>
+                  <a:srgbClr val="0070C0"/>
+                </a:solidFill>
+              </a:rPr>
+              <a:t>Think of an examples from our „excel” table</a:t>
+            </a:r>
+          </a:p>
+          <a:p>
+            <a:endParaRPr lang="en-GB" dirty="0">
+              <a:solidFill>
+                <a:srgbClr val="0070C0"/>
+              </a:solidFill>
+            </a:endParaRPr>
+          </a:p>
+        </p:txBody>
+      </p:sp>
     </p:spTree>
     <p:extLst>
       <p:ext uri="{BB962C8B-B14F-4D97-AF65-F5344CB8AC3E}">
-        <p14:creationId xmlns:p14="http://schemas.microsoft.com/office/powerpoint/2010/main" val="3678811418"/>
+        <p14:creationId xmlns:p14="http://schemas.microsoft.com/office/powerpoint/2010/main" val="4064081264"/>
       </p:ext>
     </p:extLst>
   </p:cSld>
@@ -7957,86 +9421,12 @@
           <a:chExt cx="0" cy="0"/>
         </a:xfrm>
       </p:grpSpPr>
-      <p:sp>
-        <p:nvSpPr>
-          <p:cNvPr id="3" name="TextBox 2">
-            <a:extLst>
-              <a:ext uri="{FF2B5EF4-FFF2-40B4-BE49-F238E27FC236}">
-                <a16:creationId xmlns:a16="http://schemas.microsoft.com/office/drawing/2014/main" id="{CC9F008A-0A52-314A-9B20-E8308A46FAC5}"/>
-              </a:ext>
-            </a:extLst>
-          </p:cNvPr>
-          <p:cNvSpPr txBox="1"/>
-          <p:nvPr/>
-        </p:nvSpPr>
-        <p:spPr>
-          <a:xfrm>
-            <a:off x="1135005" y="185352"/>
-            <a:ext cx="9464530" cy="523220"/>
-          </a:xfrm>
-          <a:prstGeom prst="rect">
-            <a:avLst/>
-          </a:prstGeom>
-          <a:noFill/>
-        </p:spPr>
-        <p:txBody>
-          <a:bodyPr wrap="square">
-            <a:spAutoFit/>
-          </a:bodyPr>
-          <a:lstStyle/>
-          <a:p>
-            <a:r>
-              <a:rPr lang="en-GB" sz="2800" dirty="0">
-                <a:solidFill>
-                  <a:srgbClr val="0070C0"/>
-                </a:solidFill>
-              </a:rPr>
-              <a:t>Minimum information shared</a:t>
-            </a:r>
-          </a:p>
-        </p:txBody>
-      </p:sp>
       <p:pic>
         <p:nvPicPr>
-          <p:cNvPr id="5" name="Picture 4" descr="Graphical user interface, application&#10;&#10;Description automatically generated">
-            <a:extLst>
-              <a:ext uri="{FF2B5EF4-FFF2-40B4-BE49-F238E27FC236}">
-                <a16:creationId xmlns:a16="http://schemas.microsoft.com/office/drawing/2014/main" id="{9BC36440-7734-2147-88B9-EBF47ECA9558}"/>
-              </a:ext>
-            </a:extLst>
-          </p:cNvPr>
-          <p:cNvPicPr>
-            <a:picLocks noChangeAspect="1"/>
-          </p:cNvPicPr>
-          <p:nvPr/>
-        </p:nvPicPr>
-        <p:blipFill rotWithShape="1">
-          <a:blip r:embed="rId3">
-            <a:extLst>
-              <a:ext uri="{28A0092B-C50C-407E-A947-70E740481C1C}">
-                <a14:useLocalDpi xmlns:a14="http://schemas.microsoft.com/office/drawing/2010/main" val="0"/>
-              </a:ext>
-            </a:extLst>
-          </a:blip>
-          <a:srcRect r="16110" b="34570"/>
-          <a:stretch/>
-        </p:blipFill>
-        <p:spPr>
-          <a:xfrm>
-            <a:off x="205997" y="1069817"/>
-            <a:ext cx="11780005" cy="5184228"/>
-          </a:xfrm>
-          <a:prstGeom prst="rect">
-            <a:avLst/>
-          </a:prstGeom>
-        </p:spPr>
-      </p:pic>
-      <p:pic>
-        <p:nvPicPr>
-          <p:cNvPr id="4" name="Picture 2" descr="Ed_DaSH">
-            <a:extLst>
-              <a:ext uri="{FF2B5EF4-FFF2-40B4-BE49-F238E27FC236}">
-                <a16:creationId xmlns:a16="http://schemas.microsoft.com/office/drawing/2014/main" id="{A783256F-E39E-4712-96B0-240BD611CFEB}"/>
+          <p:cNvPr id="6" name="Picture 2" descr="Ed_DaSH">
+            <a:extLst>
+              <a:ext uri="{FF2B5EF4-FFF2-40B4-BE49-F238E27FC236}">
+                <a16:creationId xmlns:a16="http://schemas.microsoft.com/office/drawing/2014/main" id="{6F3CF586-06D2-46C3-A4A3-130E31C4A16F}"/>
               </a:ext>
             </a:extLst>
           </p:cNvPr>
@@ -8046,7 +9436,7 @@
           <p:nvPr/>
         </p:nvPicPr>
         <p:blipFill>
-          <a:blip r:embed="rId4">
+          <a:blip r:embed="rId3" cstate="hqprint">
             <a:extLst>
               <a:ext uri="{28A0092B-C50C-407E-A947-70E740481C1C}">
                 <a14:useLocalDpi xmlns:a14="http://schemas.microsoft.com/office/drawing/2010/main" val="0"/>
@@ -8078,10 +9468,96 @@
           </a:extLst>
         </p:spPr>
       </p:pic>
+      <p:sp>
+        <p:nvSpPr>
+          <p:cNvPr id="4" name="TextBox 3">
+            <a:extLst>
+              <a:ext uri="{FF2B5EF4-FFF2-40B4-BE49-F238E27FC236}">
+                <a16:creationId xmlns:a16="http://schemas.microsoft.com/office/drawing/2014/main" id="{544FEB5C-3600-FE4E-B43F-A4B3E93657F2}"/>
+              </a:ext>
+            </a:extLst>
+          </p:cNvPr>
+          <p:cNvSpPr txBox="1"/>
+          <p:nvPr/>
+        </p:nvSpPr>
+        <p:spPr>
+          <a:xfrm>
+            <a:off x="6749144" y="6480767"/>
+            <a:ext cx="3812596" cy="276999"/>
+          </a:xfrm>
+          <a:prstGeom prst="rect">
+            <a:avLst/>
+          </a:prstGeom>
+          <a:noFill/>
+        </p:spPr>
+        <p:txBody>
+          <a:bodyPr wrap="square">
+            <a:spAutoFit/>
+          </a:bodyPr>
+          <a:lstStyle/>
+          <a:p>
+            <a:r>
+              <a:rPr lang="en-GB" sz="1200" b="0" i="1" dirty="0">
+                <a:solidFill>
+                  <a:srgbClr val="333333"/>
+                </a:solidFill>
+                <a:effectLst/>
+                <a:latin typeface="Ubuntu"/>
+              </a:rPr>
+              <a:t>Figure credits: </a:t>
+            </a:r>
+            <a:r>
+              <a:rPr lang="en-GB" sz="1200" i="1" dirty="0">
+                <a:solidFill>
+                  <a:srgbClr val="333333"/>
+                </a:solidFill>
+                <a:latin typeface="Ubuntu"/>
+              </a:rPr>
+              <a:t>Tomasz Zielinski and Andrés Romanowski</a:t>
+            </a:r>
+            <a:endParaRPr lang="en-GB" sz="1200" dirty="0"/>
+          </a:p>
+        </p:txBody>
+      </p:sp>
+      <p:pic>
+        <p:nvPicPr>
+          <p:cNvPr id="3" name="Picture 2" descr="Graphical user interface, application, table, Excel&#10;&#10;Description automatically generated">
+            <a:extLst>
+              <a:ext uri="{FF2B5EF4-FFF2-40B4-BE49-F238E27FC236}">
+                <a16:creationId xmlns:a16="http://schemas.microsoft.com/office/drawing/2014/main" id="{45120055-0C4E-A64A-A666-D4512601C814}"/>
+              </a:ext>
+            </a:extLst>
+          </p:cNvPr>
+          <p:cNvPicPr>
+            <a:picLocks noChangeAspect="1"/>
+          </p:cNvPicPr>
+          <p:nvPr/>
+        </p:nvPicPr>
+        <p:blipFill rotWithShape="1">
+          <a:blip r:embed="rId4">
+            <a:extLst>
+              <a:ext uri="{28A0092B-C50C-407E-A947-70E740481C1C}">
+                <a14:useLocalDpi xmlns:a14="http://schemas.microsoft.com/office/drawing/2010/main" val="0"/>
+              </a:ext>
+            </a:extLst>
+          </a:blip>
+          <a:srcRect r="2407" b="3419"/>
+          <a:stretch/>
+        </p:blipFill>
+        <p:spPr>
+          <a:xfrm>
+            <a:off x="456350" y="1054341"/>
+            <a:ext cx="10301760" cy="5139630"/>
+          </a:xfrm>
+          <a:prstGeom prst="rect">
+            <a:avLst/>
+          </a:prstGeom>
+        </p:spPr>
+      </p:pic>
     </p:spTree>
     <p:extLst>
       <p:ext uri="{BB962C8B-B14F-4D97-AF65-F5344CB8AC3E}">
-        <p14:creationId xmlns:p14="http://schemas.microsoft.com/office/powerpoint/2010/main" val="2535871180"/>
+        <p14:creationId xmlns:p14="http://schemas.microsoft.com/office/powerpoint/2010/main" val="840223466"/>
       </p:ext>
     </p:extLst>
   </p:cSld>

</xml_diff>